<commit_message>
changes to slides for section 1
</commit_message>
<xml_diff>
--- a/week01/Lecture_1.pptx
+++ b/week01/Lecture_1.pptx
@@ -5,7 +5,7 @@
     <p:sldMasterId id="2147483659" r:id="rId1"/>
   </p:sldMasterIdLst>
   <p:notesMasterIdLst>
-    <p:notesMasterId r:id="rId30"/>
+    <p:notesMasterId r:id="rId25"/>
   </p:notesMasterIdLst>
   <p:sldIdLst>
     <p:sldId id="256" r:id="rId2"/>
@@ -25,17 +25,12 @@
     <p:sldId id="270" r:id="rId16"/>
     <p:sldId id="271" r:id="rId17"/>
     <p:sldId id="272" r:id="rId18"/>
-    <p:sldId id="273" r:id="rId19"/>
-    <p:sldId id="274" r:id="rId20"/>
-    <p:sldId id="275" r:id="rId21"/>
-    <p:sldId id="276" r:id="rId22"/>
-    <p:sldId id="277" r:id="rId23"/>
-    <p:sldId id="278" r:id="rId24"/>
-    <p:sldId id="279" r:id="rId25"/>
-    <p:sldId id="280" r:id="rId26"/>
-    <p:sldId id="281" r:id="rId27"/>
-    <p:sldId id="282" r:id="rId28"/>
-    <p:sldId id="283" r:id="rId29"/>
+    <p:sldId id="277" r:id="rId19"/>
+    <p:sldId id="278" r:id="rId20"/>
+    <p:sldId id="279" r:id="rId21"/>
+    <p:sldId id="281" r:id="rId22"/>
+    <p:sldId id="282" r:id="rId23"/>
+    <p:sldId id="283" r:id="rId24"/>
   </p:sldIdLst>
   <p:sldSz cx="12192000" cy="6858000"/>
   <p:notesSz cx="6858000" cy="9144000"/>
@@ -268,6 +263,11 @@
       </a:defRPr>
     </a:lvl9pPr>
   </p:defaultTextStyle>
+  <p:extLst>
+    <p:ext uri="{EFAFB233-063F-42B5-8137-9DF3F51BA10A}">
+      <p15:sldGuideLst xmlns:p15="http://schemas.microsoft.com/office/powerpoint/2012/main"/>
+    </p:ext>
+  </p:extLst>
 </p:presentation>
 </file>
 
@@ -3129,7 +3129,7 @@
   <p:cSld>
     <p:spTree>
       <p:nvGrpSpPr>
-        <p:cNvPr id="1" name="Shape 204"/>
+        <p:cNvPr id="1" name="Shape 228"/>
         <p:cNvGrpSpPr/>
         <p:nvPr/>
       </p:nvGrpSpPr>
@@ -3143,7 +3143,7 @@
       </p:grpSpPr>
       <p:sp>
         <p:nvSpPr>
-          <p:cNvPr id="205" name="Google Shape;205;p14:notes"/>
+          <p:cNvPr id="229" name="Google Shape;229;p18:notes"/>
           <p:cNvSpPr txBox="1">
             <a:spLocks noGrp="1"/>
           </p:cNvSpPr>
@@ -3181,7 +3181,7 @@
       </p:sp>
       <p:sp>
         <p:nvSpPr>
-          <p:cNvPr id="206" name="Google Shape;206;p14:notes"/>
+          <p:cNvPr id="230" name="Google Shape;230;p18:notes"/>
           <p:cNvSpPr>
             <a:spLocks noGrp="1" noRot="1" noChangeAspect="1"/>
           </p:cNvSpPr>
@@ -3233,7 +3233,7 @@
   <p:cSld>
     <p:spTree>
       <p:nvGrpSpPr>
-        <p:cNvPr id="1" name="Shape 210"/>
+        <p:cNvPr id="1" name="Shape 234"/>
         <p:cNvGrpSpPr/>
         <p:nvPr/>
       </p:nvGrpSpPr>
@@ -3247,7 +3247,7 @@
       </p:grpSpPr>
       <p:sp>
         <p:nvSpPr>
-          <p:cNvPr id="211" name="Google Shape;211;p15:notes"/>
+          <p:cNvPr id="235" name="Google Shape;235;p19:notes"/>
           <p:cNvSpPr txBox="1">
             <a:spLocks noGrp="1"/>
           </p:cNvSpPr>
@@ -3285,7 +3285,7 @@
       </p:sp>
       <p:sp>
         <p:nvSpPr>
-          <p:cNvPr id="212" name="Google Shape;212;p15:notes"/>
+          <p:cNvPr id="236" name="Google Shape;236;p19:notes"/>
           <p:cNvSpPr>
             <a:spLocks noGrp="1" noRot="1" noChangeAspect="1"/>
           </p:cNvSpPr>
@@ -3441,7 +3441,7 @@
   <p:cSld>
     <p:spTree>
       <p:nvGrpSpPr>
-        <p:cNvPr id="1" name="Shape 216"/>
+        <p:cNvPr id="1" name="Shape 240"/>
         <p:cNvGrpSpPr/>
         <p:nvPr/>
       </p:nvGrpSpPr>
@@ -3455,7 +3455,7 @@
       </p:grpSpPr>
       <p:sp>
         <p:nvSpPr>
-          <p:cNvPr id="217" name="Google Shape;217;p16:notes"/>
+          <p:cNvPr id="241" name="Google Shape;241;p20:notes"/>
           <p:cNvSpPr txBox="1">
             <a:spLocks noGrp="1"/>
           </p:cNvSpPr>
@@ -3493,7 +3493,7 @@
       </p:sp>
       <p:sp>
         <p:nvSpPr>
-          <p:cNvPr id="218" name="Google Shape;218;p16:notes"/>
+          <p:cNvPr id="242" name="Google Shape;242;p20:notes"/>
           <p:cNvSpPr>
             <a:spLocks noGrp="1" noRot="1" noChangeAspect="1"/>
           </p:cNvSpPr>
@@ -3545,7 +3545,7 @@
   <p:cSld>
     <p:spTree>
       <p:nvGrpSpPr>
-        <p:cNvPr id="1" name="Shape 222"/>
+        <p:cNvPr id="1" name="Shape 252"/>
         <p:cNvGrpSpPr/>
         <p:nvPr/>
       </p:nvGrpSpPr>
@@ -3559,7 +3559,7 @@
       </p:grpSpPr>
       <p:sp>
         <p:nvSpPr>
-          <p:cNvPr id="223" name="Google Shape;223;p17:notes"/>
+          <p:cNvPr id="253" name="Google Shape;253;p22:notes"/>
           <p:cNvSpPr txBox="1">
             <a:spLocks noGrp="1"/>
           </p:cNvSpPr>
@@ -3597,7 +3597,7 @@
       </p:sp>
       <p:sp>
         <p:nvSpPr>
-          <p:cNvPr id="224" name="Google Shape;224;p17:notes"/>
+          <p:cNvPr id="254" name="Google Shape;254;p22:notes"/>
           <p:cNvSpPr>
             <a:spLocks noGrp="1" noRot="1" noChangeAspect="1"/>
           </p:cNvSpPr>
@@ -3649,526 +3649,6 @@
   <p:cSld>
     <p:spTree>
       <p:nvGrpSpPr>
-        <p:cNvPr id="1" name="Shape 228"/>
-        <p:cNvGrpSpPr/>
-        <p:nvPr/>
-      </p:nvGrpSpPr>
-      <p:grpSpPr>
-        <a:xfrm>
-          <a:off x="0" y="0"/>
-          <a:ext cx="0" cy="0"/>
-          <a:chOff x="0" y="0"/>
-          <a:chExt cx="0" cy="0"/>
-        </a:xfrm>
-      </p:grpSpPr>
-      <p:sp>
-        <p:nvSpPr>
-          <p:cNvPr id="229" name="Google Shape;229;p18:notes"/>
-          <p:cNvSpPr txBox="1">
-            <a:spLocks noGrp="1"/>
-          </p:cNvSpPr>
-          <p:nvPr>
-            <p:ph type="body" idx="1"/>
-          </p:nvPr>
-        </p:nvSpPr>
-        <p:spPr>
-          <a:xfrm>
-            <a:off x="685800" y="4400550"/>
-            <a:ext cx="5486400" cy="3600450"/>
-          </a:xfrm>
-          <a:prstGeom prst="rect">
-            <a:avLst/>
-          </a:prstGeom>
-        </p:spPr>
-        <p:txBody>
-          <a:bodyPr spcFirstLastPara="1" wrap="square" lIns="91425" tIns="45700" rIns="91425" bIns="45700" anchor="t" anchorCtr="0">
-            <a:noAutofit/>
-          </a:bodyPr>
-          <a:lstStyle/>
-          <a:p>
-            <a:pPr marL="0" lvl="0" indent="0" algn="l" rtl="0">
-              <a:spcBef>
-                <a:spcPts val="0"/>
-              </a:spcBef>
-              <a:spcAft>
-                <a:spcPts val="0"/>
-              </a:spcAft>
-              <a:buNone/>
-            </a:pPr>
-            <a:endParaRPr/>
-          </a:p>
-        </p:txBody>
-      </p:sp>
-      <p:sp>
-        <p:nvSpPr>
-          <p:cNvPr id="230" name="Google Shape;230;p18:notes"/>
-          <p:cNvSpPr>
-            <a:spLocks noGrp="1" noRot="1" noChangeAspect="1"/>
-          </p:cNvSpPr>
-          <p:nvPr>
-            <p:ph type="sldImg" idx="2"/>
-          </p:nvPr>
-        </p:nvSpPr>
-        <p:spPr>
-          <a:xfrm>
-            <a:off x="685800" y="1143000"/>
-            <a:ext cx="5486400" cy="3086100"/>
-          </a:xfrm>
-          <a:custGeom>
-            <a:avLst/>
-            <a:gdLst/>
-            <a:ahLst/>
-            <a:cxnLst/>
-            <a:rect l="l" t="t" r="r" b="b"/>
-            <a:pathLst>
-              <a:path w="120000" h="120000" extrusionOk="0">
-                <a:moveTo>
-                  <a:pt x="0" y="0"/>
-                </a:moveTo>
-                <a:lnTo>
-                  <a:pt x="120000" y="0"/>
-                </a:lnTo>
-                <a:lnTo>
-                  <a:pt x="120000" y="120000"/>
-                </a:lnTo>
-                <a:lnTo>
-                  <a:pt x="0" y="120000"/>
-                </a:lnTo>
-                <a:close/>
-              </a:path>
-            </a:pathLst>
-          </a:custGeom>
-        </p:spPr>
-      </p:sp>
-    </p:spTree>
-  </p:cSld>
-  <p:clrMapOvr>
-    <a:masterClrMapping/>
-  </p:clrMapOvr>
-</p:notes>
-</file>
-
-<file path=ppt/notesSlides/notesSlide23.xml><?xml version="1.0" encoding="utf-8"?>
-<p:notes xmlns:a="http://schemas.openxmlformats.org/drawingml/2006/main" xmlns:r="http://schemas.openxmlformats.org/officeDocument/2006/relationships" xmlns:p="http://schemas.openxmlformats.org/presentationml/2006/main" showMasterSp="0" showMasterPhAnim="0">
-  <p:cSld>
-    <p:spTree>
-      <p:nvGrpSpPr>
-        <p:cNvPr id="1" name="Shape 234"/>
-        <p:cNvGrpSpPr/>
-        <p:nvPr/>
-      </p:nvGrpSpPr>
-      <p:grpSpPr>
-        <a:xfrm>
-          <a:off x="0" y="0"/>
-          <a:ext cx="0" cy="0"/>
-          <a:chOff x="0" y="0"/>
-          <a:chExt cx="0" cy="0"/>
-        </a:xfrm>
-      </p:grpSpPr>
-      <p:sp>
-        <p:nvSpPr>
-          <p:cNvPr id="235" name="Google Shape;235;p19:notes"/>
-          <p:cNvSpPr txBox="1">
-            <a:spLocks noGrp="1"/>
-          </p:cNvSpPr>
-          <p:nvPr>
-            <p:ph type="body" idx="1"/>
-          </p:nvPr>
-        </p:nvSpPr>
-        <p:spPr>
-          <a:xfrm>
-            <a:off x="685800" y="4400550"/>
-            <a:ext cx="5486400" cy="3600450"/>
-          </a:xfrm>
-          <a:prstGeom prst="rect">
-            <a:avLst/>
-          </a:prstGeom>
-        </p:spPr>
-        <p:txBody>
-          <a:bodyPr spcFirstLastPara="1" wrap="square" lIns="91425" tIns="45700" rIns="91425" bIns="45700" anchor="t" anchorCtr="0">
-            <a:noAutofit/>
-          </a:bodyPr>
-          <a:lstStyle/>
-          <a:p>
-            <a:pPr marL="0" lvl="0" indent="0" algn="l" rtl="0">
-              <a:spcBef>
-                <a:spcPts val="0"/>
-              </a:spcBef>
-              <a:spcAft>
-                <a:spcPts val="0"/>
-              </a:spcAft>
-              <a:buNone/>
-            </a:pPr>
-            <a:endParaRPr/>
-          </a:p>
-        </p:txBody>
-      </p:sp>
-      <p:sp>
-        <p:nvSpPr>
-          <p:cNvPr id="236" name="Google Shape;236;p19:notes"/>
-          <p:cNvSpPr>
-            <a:spLocks noGrp="1" noRot="1" noChangeAspect="1"/>
-          </p:cNvSpPr>
-          <p:nvPr>
-            <p:ph type="sldImg" idx="2"/>
-          </p:nvPr>
-        </p:nvSpPr>
-        <p:spPr>
-          <a:xfrm>
-            <a:off x="685800" y="1143000"/>
-            <a:ext cx="5486400" cy="3086100"/>
-          </a:xfrm>
-          <a:custGeom>
-            <a:avLst/>
-            <a:gdLst/>
-            <a:ahLst/>
-            <a:cxnLst/>
-            <a:rect l="l" t="t" r="r" b="b"/>
-            <a:pathLst>
-              <a:path w="120000" h="120000" extrusionOk="0">
-                <a:moveTo>
-                  <a:pt x="0" y="0"/>
-                </a:moveTo>
-                <a:lnTo>
-                  <a:pt x="120000" y="0"/>
-                </a:lnTo>
-                <a:lnTo>
-                  <a:pt x="120000" y="120000"/>
-                </a:lnTo>
-                <a:lnTo>
-                  <a:pt x="0" y="120000"/>
-                </a:lnTo>
-                <a:close/>
-              </a:path>
-            </a:pathLst>
-          </a:custGeom>
-        </p:spPr>
-      </p:sp>
-    </p:spTree>
-  </p:cSld>
-  <p:clrMapOvr>
-    <a:masterClrMapping/>
-  </p:clrMapOvr>
-</p:notes>
-</file>
-
-<file path=ppt/notesSlides/notesSlide24.xml><?xml version="1.0" encoding="utf-8"?>
-<p:notes xmlns:a="http://schemas.openxmlformats.org/drawingml/2006/main" xmlns:r="http://schemas.openxmlformats.org/officeDocument/2006/relationships" xmlns:p="http://schemas.openxmlformats.org/presentationml/2006/main" showMasterSp="0" showMasterPhAnim="0">
-  <p:cSld>
-    <p:spTree>
-      <p:nvGrpSpPr>
-        <p:cNvPr id="1" name="Shape 240"/>
-        <p:cNvGrpSpPr/>
-        <p:nvPr/>
-      </p:nvGrpSpPr>
-      <p:grpSpPr>
-        <a:xfrm>
-          <a:off x="0" y="0"/>
-          <a:ext cx="0" cy="0"/>
-          <a:chOff x="0" y="0"/>
-          <a:chExt cx="0" cy="0"/>
-        </a:xfrm>
-      </p:grpSpPr>
-      <p:sp>
-        <p:nvSpPr>
-          <p:cNvPr id="241" name="Google Shape;241;p20:notes"/>
-          <p:cNvSpPr txBox="1">
-            <a:spLocks noGrp="1"/>
-          </p:cNvSpPr>
-          <p:nvPr>
-            <p:ph type="body" idx="1"/>
-          </p:nvPr>
-        </p:nvSpPr>
-        <p:spPr>
-          <a:xfrm>
-            <a:off x="685800" y="4400550"/>
-            <a:ext cx="5486400" cy="3600450"/>
-          </a:xfrm>
-          <a:prstGeom prst="rect">
-            <a:avLst/>
-          </a:prstGeom>
-        </p:spPr>
-        <p:txBody>
-          <a:bodyPr spcFirstLastPara="1" wrap="square" lIns="91425" tIns="45700" rIns="91425" bIns="45700" anchor="t" anchorCtr="0">
-            <a:noAutofit/>
-          </a:bodyPr>
-          <a:lstStyle/>
-          <a:p>
-            <a:pPr marL="0" lvl="0" indent="0" algn="l" rtl="0">
-              <a:spcBef>
-                <a:spcPts val="0"/>
-              </a:spcBef>
-              <a:spcAft>
-                <a:spcPts val="0"/>
-              </a:spcAft>
-              <a:buNone/>
-            </a:pPr>
-            <a:endParaRPr/>
-          </a:p>
-        </p:txBody>
-      </p:sp>
-      <p:sp>
-        <p:nvSpPr>
-          <p:cNvPr id="242" name="Google Shape;242;p20:notes"/>
-          <p:cNvSpPr>
-            <a:spLocks noGrp="1" noRot="1" noChangeAspect="1"/>
-          </p:cNvSpPr>
-          <p:nvPr>
-            <p:ph type="sldImg" idx="2"/>
-          </p:nvPr>
-        </p:nvSpPr>
-        <p:spPr>
-          <a:xfrm>
-            <a:off x="685800" y="1143000"/>
-            <a:ext cx="5486400" cy="3086100"/>
-          </a:xfrm>
-          <a:custGeom>
-            <a:avLst/>
-            <a:gdLst/>
-            <a:ahLst/>
-            <a:cxnLst/>
-            <a:rect l="l" t="t" r="r" b="b"/>
-            <a:pathLst>
-              <a:path w="120000" h="120000" extrusionOk="0">
-                <a:moveTo>
-                  <a:pt x="0" y="0"/>
-                </a:moveTo>
-                <a:lnTo>
-                  <a:pt x="120000" y="0"/>
-                </a:lnTo>
-                <a:lnTo>
-                  <a:pt x="120000" y="120000"/>
-                </a:lnTo>
-                <a:lnTo>
-                  <a:pt x="0" y="120000"/>
-                </a:lnTo>
-                <a:close/>
-              </a:path>
-            </a:pathLst>
-          </a:custGeom>
-        </p:spPr>
-      </p:sp>
-    </p:spTree>
-  </p:cSld>
-  <p:clrMapOvr>
-    <a:masterClrMapping/>
-  </p:clrMapOvr>
-</p:notes>
-</file>
-
-<file path=ppt/notesSlides/notesSlide25.xml><?xml version="1.0" encoding="utf-8"?>
-<p:notes xmlns:a="http://schemas.openxmlformats.org/drawingml/2006/main" xmlns:r="http://schemas.openxmlformats.org/officeDocument/2006/relationships" xmlns:p="http://schemas.openxmlformats.org/presentationml/2006/main" showMasterSp="0" showMasterPhAnim="0">
-  <p:cSld>
-    <p:spTree>
-      <p:nvGrpSpPr>
-        <p:cNvPr id="1" name="Shape 246"/>
-        <p:cNvGrpSpPr/>
-        <p:nvPr/>
-      </p:nvGrpSpPr>
-      <p:grpSpPr>
-        <a:xfrm>
-          <a:off x="0" y="0"/>
-          <a:ext cx="0" cy="0"/>
-          <a:chOff x="0" y="0"/>
-          <a:chExt cx="0" cy="0"/>
-        </a:xfrm>
-      </p:grpSpPr>
-      <p:sp>
-        <p:nvSpPr>
-          <p:cNvPr id="247" name="Google Shape;247;p21:notes"/>
-          <p:cNvSpPr txBox="1">
-            <a:spLocks noGrp="1"/>
-          </p:cNvSpPr>
-          <p:nvPr>
-            <p:ph type="body" idx="1"/>
-          </p:nvPr>
-        </p:nvSpPr>
-        <p:spPr>
-          <a:xfrm>
-            <a:off x="685800" y="4400550"/>
-            <a:ext cx="5486400" cy="3600450"/>
-          </a:xfrm>
-          <a:prstGeom prst="rect">
-            <a:avLst/>
-          </a:prstGeom>
-        </p:spPr>
-        <p:txBody>
-          <a:bodyPr spcFirstLastPara="1" wrap="square" lIns="91425" tIns="45700" rIns="91425" bIns="45700" anchor="t" anchorCtr="0">
-            <a:noAutofit/>
-          </a:bodyPr>
-          <a:lstStyle/>
-          <a:p>
-            <a:pPr marL="0" lvl="0" indent="0" algn="l" rtl="0">
-              <a:spcBef>
-                <a:spcPts val="0"/>
-              </a:spcBef>
-              <a:spcAft>
-                <a:spcPts val="0"/>
-              </a:spcAft>
-              <a:buNone/>
-            </a:pPr>
-            <a:endParaRPr/>
-          </a:p>
-        </p:txBody>
-      </p:sp>
-      <p:sp>
-        <p:nvSpPr>
-          <p:cNvPr id="248" name="Google Shape;248;p21:notes"/>
-          <p:cNvSpPr>
-            <a:spLocks noGrp="1" noRot="1" noChangeAspect="1"/>
-          </p:cNvSpPr>
-          <p:nvPr>
-            <p:ph type="sldImg" idx="2"/>
-          </p:nvPr>
-        </p:nvSpPr>
-        <p:spPr>
-          <a:xfrm>
-            <a:off x="685800" y="1143000"/>
-            <a:ext cx="5486400" cy="3086100"/>
-          </a:xfrm>
-          <a:custGeom>
-            <a:avLst/>
-            <a:gdLst/>
-            <a:ahLst/>
-            <a:cxnLst/>
-            <a:rect l="l" t="t" r="r" b="b"/>
-            <a:pathLst>
-              <a:path w="120000" h="120000" extrusionOk="0">
-                <a:moveTo>
-                  <a:pt x="0" y="0"/>
-                </a:moveTo>
-                <a:lnTo>
-                  <a:pt x="120000" y="0"/>
-                </a:lnTo>
-                <a:lnTo>
-                  <a:pt x="120000" y="120000"/>
-                </a:lnTo>
-                <a:lnTo>
-                  <a:pt x="0" y="120000"/>
-                </a:lnTo>
-                <a:close/>
-              </a:path>
-            </a:pathLst>
-          </a:custGeom>
-        </p:spPr>
-      </p:sp>
-    </p:spTree>
-  </p:cSld>
-  <p:clrMapOvr>
-    <a:masterClrMapping/>
-  </p:clrMapOvr>
-</p:notes>
-</file>
-
-<file path=ppt/notesSlides/notesSlide26.xml><?xml version="1.0" encoding="utf-8"?>
-<p:notes xmlns:a="http://schemas.openxmlformats.org/drawingml/2006/main" xmlns:r="http://schemas.openxmlformats.org/officeDocument/2006/relationships" xmlns:p="http://schemas.openxmlformats.org/presentationml/2006/main" showMasterSp="0" showMasterPhAnim="0">
-  <p:cSld>
-    <p:spTree>
-      <p:nvGrpSpPr>
-        <p:cNvPr id="1" name="Shape 252"/>
-        <p:cNvGrpSpPr/>
-        <p:nvPr/>
-      </p:nvGrpSpPr>
-      <p:grpSpPr>
-        <a:xfrm>
-          <a:off x="0" y="0"/>
-          <a:ext cx="0" cy="0"/>
-          <a:chOff x="0" y="0"/>
-          <a:chExt cx="0" cy="0"/>
-        </a:xfrm>
-      </p:grpSpPr>
-      <p:sp>
-        <p:nvSpPr>
-          <p:cNvPr id="253" name="Google Shape;253;p22:notes"/>
-          <p:cNvSpPr txBox="1">
-            <a:spLocks noGrp="1"/>
-          </p:cNvSpPr>
-          <p:nvPr>
-            <p:ph type="body" idx="1"/>
-          </p:nvPr>
-        </p:nvSpPr>
-        <p:spPr>
-          <a:xfrm>
-            <a:off x="685800" y="4400550"/>
-            <a:ext cx="5486400" cy="3600450"/>
-          </a:xfrm>
-          <a:prstGeom prst="rect">
-            <a:avLst/>
-          </a:prstGeom>
-        </p:spPr>
-        <p:txBody>
-          <a:bodyPr spcFirstLastPara="1" wrap="square" lIns="91425" tIns="45700" rIns="91425" bIns="45700" anchor="t" anchorCtr="0">
-            <a:noAutofit/>
-          </a:bodyPr>
-          <a:lstStyle/>
-          <a:p>
-            <a:pPr marL="0" lvl="0" indent="0" algn="l" rtl="0">
-              <a:spcBef>
-                <a:spcPts val="0"/>
-              </a:spcBef>
-              <a:spcAft>
-                <a:spcPts val="0"/>
-              </a:spcAft>
-              <a:buNone/>
-            </a:pPr>
-            <a:endParaRPr/>
-          </a:p>
-        </p:txBody>
-      </p:sp>
-      <p:sp>
-        <p:nvSpPr>
-          <p:cNvPr id="254" name="Google Shape;254;p22:notes"/>
-          <p:cNvSpPr>
-            <a:spLocks noGrp="1" noRot="1" noChangeAspect="1"/>
-          </p:cNvSpPr>
-          <p:nvPr>
-            <p:ph type="sldImg" idx="2"/>
-          </p:nvPr>
-        </p:nvSpPr>
-        <p:spPr>
-          <a:xfrm>
-            <a:off x="685800" y="1143000"/>
-            <a:ext cx="5486400" cy="3086100"/>
-          </a:xfrm>
-          <a:custGeom>
-            <a:avLst/>
-            <a:gdLst/>
-            <a:ahLst/>
-            <a:cxnLst/>
-            <a:rect l="l" t="t" r="r" b="b"/>
-            <a:pathLst>
-              <a:path w="120000" h="120000" extrusionOk="0">
-                <a:moveTo>
-                  <a:pt x="0" y="0"/>
-                </a:moveTo>
-                <a:lnTo>
-                  <a:pt x="120000" y="0"/>
-                </a:lnTo>
-                <a:lnTo>
-                  <a:pt x="120000" y="120000"/>
-                </a:lnTo>
-                <a:lnTo>
-                  <a:pt x="0" y="120000"/>
-                </a:lnTo>
-                <a:close/>
-              </a:path>
-            </a:pathLst>
-          </a:custGeom>
-        </p:spPr>
-      </p:sp>
-    </p:spTree>
-  </p:cSld>
-  <p:clrMapOvr>
-    <a:masterClrMapping/>
-  </p:clrMapOvr>
-</p:notes>
-</file>
-
-<file path=ppt/notesSlides/notesSlide27.xml><?xml version="1.0" encoding="utf-8"?>
-<p:notes xmlns:a="http://schemas.openxmlformats.org/drawingml/2006/main" xmlns:r="http://schemas.openxmlformats.org/officeDocument/2006/relationships" xmlns:p="http://schemas.openxmlformats.org/presentationml/2006/main" showMasterSp="0" showMasterPhAnim="0">
-  <p:cSld>
-    <p:spTree>
-      <p:nvGrpSpPr>
         <p:cNvPr id="1" name="Shape 258"/>
         <p:cNvGrpSpPr/>
         <p:nvPr/>
@@ -4268,7 +3748,7 @@
 </p:notes>
 </file>
 
-<file path=ppt/notesSlides/notesSlide28.xml><?xml version="1.0" encoding="utf-8"?>
+<file path=ppt/notesSlides/notesSlide23.xml><?xml version="1.0" encoding="utf-8"?>
 <p:notes xmlns:a="http://schemas.openxmlformats.org/drawingml/2006/main" xmlns:r="http://schemas.openxmlformats.org/officeDocument/2006/relationships" xmlns:p="http://schemas.openxmlformats.org/presentationml/2006/main" showMasterSp="0" showMasterPhAnim="0">
   <p:cSld>
     <p:spTree>
@@ -15835,10 +15315,10 @@
               <a:buNone/>
             </a:pPr>
             <a:r>
-              <a:rPr lang="en-US"/>
+              <a:rPr lang="en-US" dirty="0"/>
               <a:t>Intro to W251</a:t>
             </a:r>
-            <a:endParaRPr/>
+            <a:endParaRPr dirty="0"/>
           </a:p>
         </p:txBody>
       </p:sp>
@@ -15854,8 +15334,8 @@
         </p:nvSpPr>
         <p:spPr>
           <a:xfrm>
-            <a:off x="1524000" y="3602038"/>
-            <a:ext cx="9144000" cy="1655700"/>
+            <a:off x="1523999" y="3602037"/>
+            <a:ext cx="10178144" cy="2896734"/>
           </a:xfrm>
           <a:prstGeom prst="rect">
             <a:avLst/>
@@ -15867,7 +15347,7 @@
         </p:spPr>
         <p:txBody>
           <a:bodyPr spcFirstLastPara="1" wrap="square" lIns="91425" tIns="45700" rIns="91425" bIns="45700" anchor="t" anchorCtr="0">
-            <a:normAutofit fontScale="40000" lnSpcReduction="20000"/>
+            <a:normAutofit/>
           </a:bodyPr>
           <a:lstStyle/>
           <a:p>
@@ -15888,10 +15368,10 @@
               <a:buNone/>
             </a:pPr>
             <a:r>
-              <a:rPr lang="en-US"/>
+              <a:rPr lang="en-US" dirty="0"/>
               <a:t>Deep Learning in the Cloud and at the Edge</a:t>
             </a:r>
-            <a:endParaRPr/>
+            <a:endParaRPr dirty="0"/>
           </a:p>
           <a:p>
             <a:pPr marL="0" lvl="0" indent="0" algn="ctr" rtl="0">
@@ -15911,10 +15391,14 @@
               <a:buNone/>
             </a:pPr>
             <a:r>
-              <a:rPr lang="en-US"/>
-              <a:t>Dima Rekesh</a:t>
+              <a:rPr lang="en-US" dirty="0"/>
+              <a:t>Dima </a:t>
             </a:r>
-            <a:endParaRPr/>
+            <a:r>
+              <a:rPr lang="en-US" dirty="0" err="1"/>
+              <a:t>Rekesh</a:t>
+            </a:r>
+            <a:endParaRPr dirty="0"/>
           </a:p>
           <a:p>
             <a:pPr marL="0" lvl="0" indent="0" algn="ctr" rtl="0">
@@ -15934,10 +15418,10 @@
               <a:buNone/>
             </a:pPr>
             <a:r>
-              <a:rPr lang="en-US"/>
+              <a:rPr lang="en-US" dirty="0"/>
               <a:t>Esteban Arias</a:t>
             </a:r>
-            <a:endParaRPr/>
+            <a:endParaRPr dirty="0"/>
           </a:p>
           <a:p>
             <a:pPr marL="0" lvl="0" indent="0" algn="ctr" rtl="0">
@@ -15957,10 +15441,14 @@
               <a:buNone/>
             </a:pPr>
             <a:r>
-              <a:rPr lang="en-US"/>
-              <a:t>Ryan DeJana</a:t>
+              <a:rPr lang="en-US" dirty="0"/>
+              <a:t>Ryan </a:t>
             </a:r>
-            <a:endParaRPr/>
+            <a:r>
+              <a:rPr lang="en-US" dirty="0" err="1"/>
+              <a:t>DeJana</a:t>
+            </a:r>
+            <a:endParaRPr dirty="0"/>
           </a:p>
           <a:p>
             <a:pPr marL="0" lvl="0" indent="0" algn="ctr" rtl="0">
@@ -15980,10 +15468,14 @@
               <a:buNone/>
             </a:pPr>
             <a:r>
-              <a:rPr lang="en-US"/>
-              <a:t>Brad DesAulniers</a:t>
+              <a:rPr lang="en-US" dirty="0"/>
+              <a:t>Brad </a:t>
             </a:r>
-            <a:endParaRPr/>
+            <a:r>
+              <a:rPr lang="en-US" dirty="0" err="1"/>
+              <a:t>DesAulniers</a:t>
+            </a:r>
+            <a:endParaRPr dirty="0"/>
           </a:p>
           <a:p>
             <a:pPr marL="0" lvl="0" indent="0" algn="ctr" rtl="0">
@@ -16003,33 +15495,18 @@
               <a:buNone/>
             </a:pPr>
             <a:r>
-              <a:rPr lang="en-US"/>
-              <a:t>Darragh Hanley </a:t>
+              <a:rPr lang="en-US" dirty="0" err="1"/>
+              <a:t>Prabs</a:t>
             </a:r>
-            <a:endParaRPr/>
-          </a:p>
-          <a:p>
-            <a:pPr marL="0" lvl="0" indent="0" algn="ctr" rtl="0">
-              <a:lnSpc>
-                <a:spcPct val="90000"/>
-              </a:lnSpc>
-              <a:spcBef>
-                <a:spcPts val="1000"/>
-              </a:spcBef>
-              <a:spcAft>
-                <a:spcPts val="0"/>
-              </a:spcAft>
-              <a:buClr>
-                <a:schemeClr val="dk1"/>
-              </a:buClr>
-              <a:buSzPct val="100000"/>
-              <a:buNone/>
-            </a:pPr>
             <a:r>
-              <a:rPr lang="en-US"/>
-              <a:t>Prabs Attaluri</a:t>
+              <a:rPr lang="en-US" dirty="0"/>
+              <a:t> </a:t>
             </a:r>
-            <a:endParaRPr/>
+            <a:r>
+              <a:rPr lang="en-US" dirty="0" err="1"/>
+              <a:t>Attaluri</a:t>
+            </a:r>
+            <a:endParaRPr dirty="0"/>
           </a:p>
         </p:txBody>
       </p:sp>
@@ -17978,7 +17455,7 @@
   <p:cSld>
     <p:spTree>
       <p:nvGrpSpPr>
-        <p:cNvPr id="1" name="Shape 207"/>
+        <p:cNvPr id="1" name="Shape 231"/>
         <p:cNvGrpSpPr/>
         <p:nvPr/>
       </p:nvGrpSpPr>
@@ -17992,7 +17469,7 @@
       </p:grpSpPr>
       <p:sp>
         <p:nvSpPr>
-          <p:cNvPr id="208" name="Google Shape;208;p30"/>
+          <p:cNvPr id="232" name="Google Shape;232;p34"/>
           <p:cNvSpPr txBox="1">
             <a:spLocks noGrp="1"/>
           </p:cNvSpPr>
@@ -18037,16 +17514,16 @@
               <a:buNone/>
             </a:pPr>
             <a:r>
-              <a:rPr lang="en-US" dirty="0"/>
-              <a:t>CNN</a:t>
+              <a:rPr lang="en-US"/>
+              <a:t>DL in Your Daily Life</a:t>
             </a:r>
-            <a:endParaRPr dirty="0"/>
+            <a:endParaRPr/>
           </a:p>
         </p:txBody>
       </p:sp>
       <p:sp>
         <p:nvSpPr>
-          <p:cNvPr id="209" name="Google Shape;209;p30"/>
+          <p:cNvPr id="233" name="Google Shape;233;p34"/>
           <p:cNvSpPr txBox="1">
             <a:spLocks noGrp="1"/>
           </p:cNvSpPr>
@@ -18091,7 +17568,122 @@
             </a:pPr>
             <a:r>
               <a:rPr lang="en-US"/>
-              <a:t>Great for image recognition</a:t>
+              <a:t>Autonomous Vehicles</a:t>
+            </a:r>
+            <a:endParaRPr/>
+          </a:p>
+          <a:p>
+            <a:pPr marL="228600" lvl="0" indent="-228600" algn="l" rtl="0">
+              <a:lnSpc>
+                <a:spcPct val="90000"/>
+              </a:lnSpc>
+              <a:spcBef>
+                <a:spcPts val="1000"/>
+              </a:spcBef>
+              <a:spcAft>
+                <a:spcPts val="0"/>
+              </a:spcAft>
+              <a:buClr>
+                <a:schemeClr val="dk1"/>
+              </a:buClr>
+              <a:buSzPts val="2800"/>
+              <a:buChar char="•"/>
+            </a:pPr>
+            <a:r>
+              <a:rPr lang="en-US"/>
+              <a:t>Speech Recognition</a:t>
+            </a:r>
+            <a:endParaRPr/>
+          </a:p>
+          <a:p>
+            <a:pPr marL="228600" lvl="0" indent="-228600" algn="l" rtl="0">
+              <a:lnSpc>
+                <a:spcPct val="90000"/>
+              </a:lnSpc>
+              <a:spcBef>
+                <a:spcPts val="1000"/>
+              </a:spcBef>
+              <a:spcAft>
+                <a:spcPts val="0"/>
+              </a:spcAft>
+              <a:buClr>
+                <a:schemeClr val="dk1"/>
+              </a:buClr>
+              <a:buSzPts val="2800"/>
+              <a:buChar char="•"/>
+            </a:pPr>
+            <a:r>
+              <a:rPr lang="en-US"/>
+              <a:t>Chatbots</a:t>
+            </a:r>
+            <a:endParaRPr/>
+          </a:p>
+          <a:p>
+            <a:pPr marL="228600" lvl="0" indent="-228600" algn="l" rtl="0">
+              <a:lnSpc>
+                <a:spcPct val="90000"/>
+              </a:lnSpc>
+              <a:spcBef>
+                <a:spcPts val="1000"/>
+              </a:spcBef>
+              <a:spcAft>
+                <a:spcPts val="0"/>
+              </a:spcAft>
+              <a:buClr>
+                <a:schemeClr val="dk1"/>
+              </a:buClr>
+              <a:buSzPts val="2800"/>
+              <a:buChar char="•"/>
+            </a:pPr>
+            <a:r>
+              <a:rPr lang="en-US"/>
+              <a:t>Google Translate using Video</a:t>
+            </a:r>
+            <a:endParaRPr/>
+          </a:p>
+          <a:p>
+            <a:pPr marL="228600" lvl="0" indent="-228600" algn="l" rtl="0">
+              <a:lnSpc>
+                <a:spcPct val="90000"/>
+              </a:lnSpc>
+              <a:spcBef>
+                <a:spcPts val="1000"/>
+              </a:spcBef>
+              <a:spcAft>
+                <a:spcPts val="0"/>
+              </a:spcAft>
+              <a:buClr>
+                <a:schemeClr val="dk1"/>
+              </a:buClr>
+              <a:buSzPts val="2800"/>
+              <a:buChar char="•"/>
+            </a:pPr>
+            <a:r>
+              <a:rPr lang="en-US"/>
+              <a:t>Subtitles on YouTube</a:t>
+            </a:r>
+            <a:endParaRPr/>
+          </a:p>
+          <a:p>
+            <a:pPr marL="228600" lvl="0" indent="-228600" algn="l" rtl="0">
+              <a:lnSpc>
+                <a:spcPct val="90000"/>
+              </a:lnSpc>
+              <a:spcBef>
+                <a:spcPts val="1000"/>
+              </a:spcBef>
+              <a:spcAft>
+                <a:spcPts val="0"/>
+              </a:spcAft>
+              <a:buClr>
+                <a:schemeClr val="dk1"/>
+              </a:buClr>
+              <a:buSzPts val="2800"/>
+              <a:buChar char="•"/>
+            </a:pPr>
+            <a:r>
+              <a:rPr lang="en-US"/>
+              <a:t>Apple Face ID</a:t>
             </a:r>
             <a:endParaRPr/>
           </a:p>
@@ -18110,7 +17702,7 @@
   <p:cSld>
     <p:spTree>
       <p:nvGrpSpPr>
-        <p:cNvPr id="1" name="Shape 213"/>
+        <p:cNvPr id="1" name="Shape 237"/>
         <p:cNvGrpSpPr/>
         <p:nvPr/>
       </p:nvGrpSpPr>
@@ -18124,7 +17716,7 @@
       </p:grpSpPr>
       <p:sp>
         <p:nvSpPr>
-          <p:cNvPr id="214" name="Google Shape;214;p31"/>
+          <p:cNvPr id="238" name="Google Shape;238;p35"/>
           <p:cNvSpPr txBox="1">
             <a:spLocks noGrp="1"/>
           </p:cNvSpPr>
@@ -18147,7 +17739,7 @@
         </p:spPr>
         <p:txBody>
           <a:bodyPr spcFirstLastPara="1" wrap="square" lIns="91425" tIns="45700" rIns="91425" bIns="45700" anchor="ctr" anchorCtr="0">
-            <a:normAutofit/>
+            <a:noAutofit/>
           </a:bodyPr>
           <a:lstStyle/>
           <a:p>
@@ -18169,16 +17761,16 @@
               <a:buNone/>
             </a:pPr>
             <a:r>
-              <a:rPr lang="en-US" dirty="0"/>
-              <a:t>RNN</a:t>
+              <a:rPr lang="en-US"/>
+              <a:t>IoT: what is it?</a:t>
             </a:r>
-            <a:endParaRPr dirty="0"/>
+            <a:endParaRPr/>
           </a:p>
         </p:txBody>
       </p:sp>
       <p:sp>
         <p:nvSpPr>
-          <p:cNvPr id="215" name="Google Shape;215;p31"/>
+          <p:cNvPr id="239" name="Google Shape;239;p35"/>
           <p:cNvSpPr txBox="1">
             <a:spLocks noGrp="1"/>
           </p:cNvSpPr>
@@ -18222,10 +17814,148 @@
               <a:buChar char="•"/>
             </a:pPr>
             <a:r>
-              <a:rPr lang="en-US" dirty="0"/>
-              <a:t>Great for speech/text recognition</a:t>
+              <a:rPr lang="en-US"/>
+              <a:t>Internet of “Things”</a:t>
             </a:r>
-            <a:endParaRPr dirty="0"/>
+            <a:endParaRPr/>
+          </a:p>
+          <a:p>
+            <a:pPr marL="228600" lvl="0" indent="-228600" algn="l" rtl="0">
+              <a:lnSpc>
+                <a:spcPct val="90000"/>
+              </a:lnSpc>
+              <a:spcBef>
+                <a:spcPts val="1000"/>
+              </a:spcBef>
+              <a:spcAft>
+                <a:spcPts val="0"/>
+              </a:spcAft>
+              <a:buClr>
+                <a:schemeClr val="dk1"/>
+              </a:buClr>
+              <a:buSzPts val="2800"/>
+              <a:buChar char="•"/>
+            </a:pPr>
+            <a:r>
+              <a:rPr lang="en-US"/>
+              <a:t>“Things” were originally meant to be low-power, dumb</a:t>
+            </a:r>
+            <a:endParaRPr/>
+          </a:p>
+          <a:p>
+            <a:pPr marL="685800" lvl="1" indent="-228600" algn="l" rtl="0">
+              <a:lnSpc>
+                <a:spcPct val="90000"/>
+              </a:lnSpc>
+              <a:spcBef>
+                <a:spcPts val="500"/>
+              </a:spcBef>
+              <a:spcAft>
+                <a:spcPts val="0"/>
+              </a:spcAft>
+              <a:buClr>
+                <a:schemeClr val="dk1"/>
+              </a:buClr>
+              <a:buSzPts val="2400"/>
+              <a:buChar char="•"/>
+            </a:pPr>
+            <a:r>
+              <a:rPr lang="en-US"/>
+              <a:t>Aka “Sensors”</a:t>
+            </a:r>
+            <a:endParaRPr/>
+          </a:p>
+          <a:p>
+            <a:pPr marL="228600" lvl="0" indent="-228600" algn="l" rtl="0">
+              <a:lnSpc>
+                <a:spcPct val="90000"/>
+              </a:lnSpc>
+              <a:spcBef>
+                <a:spcPts val="1000"/>
+              </a:spcBef>
+              <a:spcAft>
+                <a:spcPts val="0"/>
+              </a:spcAft>
+              <a:buClr>
+                <a:schemeClr val="dk1"/>
+              </a:buClr>
+              <a:buSzPts val="2800"/>
+              <a:buChar char="•"/>
+            </a:pPr>
+            <a:r>
+              <a:rPr lang="en-US"/>
+              <a:t>Embedded OSes</a:t>
+            </a:r>
+            <a:endParaRPr/>
+          </a:p>
+          <a:p>
+            <a:pPr marL="228600" lvl="0" indent="-228600" algn="l" rtl="0">
+              <a:lnSpc>
+                <a:spcPct val="90000"/>
+              </a:lnSpc>
+              <a:spcBef>
+                <a:spcPts val="1000"/>
+              </a:spcBef>
+              <a:spcAft>
+                <a:spcPts val="0"/>
+              </a:spcAft>
+              <a:buClr>
+                <a:schemeClr val="dk1"/>
+              </a:buClr>
+              <a:buSzPts val="2800"/>
+              <a:buChar char="•"/>
+            </a:pPr>
+            <a:r>
+              <a:rPr lang="en-US"/>
+              <a:t>Arcane protocols</a:t>
+            </a:r>
+            <a:endParaRPr/>
+          </a:p>
+          <a:p>
+            <a:pPr marL="228600" lvl="0" indent="-228600" algn="l" rtl="0">
+              <a:lnSpc>
+                <a:spcPct val="90000"/>
+              </a:lnSpc>
+              <a:spcBef>
+                <a:spcPts val="1000"/>
+              </a:spcBef>
+              <a:spcAft>
+                <a:spcPts val="0"/>
+              </a:spcAft>
+              <a:buClr>
+                <a:schemeClr val="dk1"/>
+              </a:buClr>
+              <a:buSzPts val="2800"/>
+              <a:buChar char="•"/>
+            </a:pPr>
+            <a:r>
+              <a:rPr lang="en-US"/>
+              <a:t>“Things” mostly read-only</a:t>
+            </a:r>
+            <a:endParaRPr/>
+          </a:p>
+          <a:p>
+            <a:pPr marL="228600" lvl="0" indent="-228600" algn="l" rtl="0">
+              <a:lnSpc>
+                <a:spcPct val="90000"/>
+              </a:lnSpc>
+              <a:spcBef>
+                <a:spcPts val="1000"/>
+              </a:spcBef>
+              <a:spcAft>
+                <a:spcPts val="0"/>
+              </a:spcAft>
+              <a:buClr>
+                <a:schemeClr val="dk1"/>
+              </a:buClr>
+              <a:buSzPts val="2800"/>
+              <a:buChar char="•"/>
+            </a:pPr>
+            <a:r>
+              <a:rPr lang="en-US"/>
+              <a:t>“Things” send to “gateways”</a:t>
+            </a:r>
+            <a:endParaRPr/>
           </a:p>
         </p:txBody>
       </p:sp>
@@ -18546,783 +18276,6 @@
   <p:cSld>
     <p:spTree>
       <p:nvGrpSpPr>
-        <p:cNvPr id="1" name="Shape 219"/>
-        <p:cNvGrpSpPr/>
-        <p:nvPr/>
-      </p:nvGrpSpPr>
-      <p:grpSpPr>
-        <a:xfrm>
-          <a:off x="0" y="0"/>
-          <a:ext cx="0" cy="0"/>
-          <a:chOff x="0" y="0"/>
-          <a:chExt cx="0" cy="0"/>
-        </a:xfrm>
-      </p:grpSpPr>
-      <p:sp>
-        <p:nvSpPr>
-          <p:cNvPr id="220" name="Google Shape;220;p32"/>
-          <p:cNvSpPr txBox="1">
-            <a:spLocks noGrp="1"/>
-          </p:cNvSpPr>
-          <p:nvPr>
-            <p:ph type="title"/>
-          </p:nvPr>
-        </p:nvSpPr>
-        <p:spPr>
-          <a:xfrm>
-            <a:off x="838200" y="365125"/>
-            <a:ext cx="10515600" cy="1325563"/>
-          </a:xfrm>
-          <a:prstGeom prst="rect">
-            <a:avLst/>
-          </a:prstGeom>
-          <a:noFill/>
-          <a:ln>
-            <a:noFill/>
-          </a:ln>
-        </p:spPr>
-        <p:txBody>
-          <a:bodyPr spcFirstLastPara="1" wrap="square" lIns="91425" tIns="45700" rIns="91425" bIns="45700" anchor="ctr" anchorCtr="0">
-            <a:normAutofit/>
-          </a:bodyPr>
-          <a:lstStyle/>
-          <a:p>
-            <a:pPr marL="0" lvl="0" indent="0" algn="l" rtl="0">
-              <a:lnSpc>
-                <a:spcPct val="90000"/>
-              </a:lnSpc>
-              <a:spcBef>
-                <a:spcPts val="0"/>
-              </a:spcBef>
-              <a:spcAft>
-                <a:spcPts val="0"/>
-              </a:spcAft>
-              <a:buClr>
-                <a:schemeClr val="dk1"/>
-              </a:buClr>
-              <a:buSzPts val="4400"/>
-              <a:buFont typeface="Calibri"/>
-              <a:buNone/>
-            </a:pPr>
-            <a:r>
-              <a:rPr lang="en-US"/>
-              <a:t>DRL</a:t>
-            </a:r>
-            <a:endParaRPr/>
-          </a:p>
-        </p:txBody>
-      </p:sp>
-      <p:sp>
-        <p:nvSpPr>
-          <p:cNvPr id="221" name="Google Shape;221;p32"/>
-          <p:cNvSpPr txBox="1">
-            <a:spLocks noGrp="1"/>
-          </p:cNvSpPr>
-          <p:nvPr>
-            <p:ph type="body" idx="1"/>
-          </p:nvPr>
-        </p:nvSpPr>
-        <p:spPr>
-          <a:xfrm>
-            <a:off x="838200" y="1825625"/>
-            <a:ext cx="10515600" cy="4351338"/>
-          </a:xfrm>
-          <a:prstGeom prst="rect">
-            <a:avLst/>
-          </a:prstGeom>
-          <a:noFill/>
-          <a:ln>
-            <a:noFill/>
-          </a:ln>
-        </p:spPr>
-        <p:txBody>
-          <a:bodyPr spcFirstLastPara="1" wrap="square" lIns="91425" tIns="45700" rIns="91425" bIns="45700" anchor="t" anchorCtr="0">
-            <a:normAutofit/>
-          </a:bodyPr>
-          <a:lstStyle/>
-          <a:p>
-            <a:pPr marL="228600" lvl="0" indent="-228600" algn="l" rtl="0">
-              <a:lnSpc>
-                <a:spcPct val="90000"/>
-              </a:lnSpc>
-              <a:spcBef>
-                <a:spcPts val="0"/>
-              </a:spcBef>
-              <a:spcAft>
-                <a:spcPts val="0"/>
-              </a:spcAft>
-              <a:buClr>
-                <a:schemeClr val="dk1"/>
-              </a:buClr>
-              <a:buSzPts val="2800"/>
-              <a:buChar char="•"/>
-            </a:pPr>
-            <a:r>
-              <a:rPr lang="en-US"/>
-              <a:t>Great for robotics</a:t>
-            </a:r>
-            <a:endParaRPr/>
-          </a:p>
-        </p:txBody>
-      </p:sp>
-    </p:spTree>
-  </p:cSld>
-  <p:clrMapOvr>
-    <a:masterClrMapping/>
-  </p:clrMapOvr>
-</p:sld>
-</file>
-
-<file path=ppt/slides/slide21.xml><?xml version="1.0" encoding="utf-8"?>
-<p:sld xmlns:a="http://schemas.openxmlformats.org/drawingml/2006/main" xmlns:r="http://schemas.openxmlformats.org/officeDocument/2006/relationships" xmlns:p="http://schemas.openxmlformats.org/presentationml/2006/main">
-  <p:cSld>
-    <p:spTree>
-      <p:nvGrpSpPr>
-        <p:cNvPr id="1" name="Shape 225"/>
-        <p:cNvGrpSpPr/>
-        <p:nvPr/>
-      </p:nvGrpSpPr>
-      <p:grpSpPr>
-        <a:xfrm>
-          <a:off x="0" y="0"/>
-          <a:ext cx="0" cy="0"/>
-          <a:chOff x="0" y="0"/>
-          <a:chExt cx="0" cy="0"/>
-        </a:xfrm>
-      </p:grpSpPr>
-      <p:sp>
-        <p:nvSpPr>
-          <p:cNvPr id="226" name="Google Shape;226;p33"/>
-          <p:cNvSpPr txBox="1">
-            <a:spLocks noGrp="1"/>
-          </p:cNvSpPr>
-          <p:nvPr>
-            <p:ph type="title"/>
-          </p:nvPr>
-        </p:nvSpPr>
-        <p:spPr>
-          <a:xfrm>
-            <a:off x="838200" y="365125"/>
-            <a:ext cx="10515600" cy="1325563"/>
-          </a:xfrm>
-          <a:prstGeom prst="rect">
-            <a:avLst/>
-          </a:prstGeom>
-          <a:noFill/>
-          <a:ln>
-            <a:noFill/>
-          </a:ln>
-        </p:spPr>
-        <p:txBody>
-          <a:bodyPr spcFirstLastPara="1" wrap="square" lIns="91425" tIns="45700" rIns="91425" bIns="45700" anchor="ctr" anchorCtr="0">
-            <a:normAutofit/>
-          </a:bodyPr>
-          <a:lstStyle/>
-          <a:p>
-            <a:pPr marL="0" lvl="0" indent="0" algn="l" rtl="0">
-              <a:lnSpc>
-                <a:spcPct val="90000"/>
-              </a:lnSpc>
-              <a:spcBef>
-                <a:spcPts val="0"/>
-              </a:spcBef>
-              <a:spcAft>
-                <a:spcPts val="0"/>
-              </a:spcAft>
-              <a:buClr>
-                <a:schemeClr val="dk1"/>
-              </a:buClr>
-              <a:buSzPts val="4400"/>
-              <a:buFont typeface="Calibri"/>
-              <a:buNone/>
-            </a:pPr>
-            <a:r>
-              <a:rPr lang="en-US"/>
-              <a:t>Current State of the Art in DL</a:t>
-            </a:r>
-            <a:endParaRPr/>
-          </a:p>
-        </p:txBody>
-      </p:sp>
-      <p:sp>
-        <p:nvSpPr>
-          <p:cNvPr id="227" name="Google Shape;227;p33"/>
-          <p:cNvSpPr txBox="1">
-            <a:spLocks noGrp="1"/>
-          </p:cNvSpPr>
-          <p:nvPr>
-            <p:ph type="body" idx="1"/>
-          </p:nvPr>
-        </p:nvSpPr>
-        <p:spPr>
-          <a:xfrm>
-            <a:off x="838200" y="1825625"/>
-            <a:ext cx="10515600" cy="4351338"/>
-          </a:xfrm>
-          <a:prstGeom prst="rect">
-            <a:avLst/>
-          </a:prstGeom>
-          <a:noFill/>
-          <a:ln>
-            <a:noFill/>
-          </a:ln>
-        </p:spPr>
-        <p:txBody>
-          <a:bodyPr spcFirstLastPara="1" wrap="square" lIns="91425" tIns="45700" rIns="91425" bIns="45700" anchor="t" anchorCtr="0">
-            <a:normAutofit/>
-          </a:bodyPr>
-          <a:lstStyle/>
-          <a:p>
-            <a:pPr marL="228600" lvl="0" indent="-50800" algn="l" rtl="0">
-              <a:lnSpc>
-                <a:spcPct val="90000"/>
-              </a:lnSpc>
-              <a:spcBef>
-                <a:spcPts val="0"/>
-              </a:spcBef>
-              <a:spcAft>
-                <a:spcPts val="0"/>
-              </a:spcAft>
-              <a:buClr>
-                <a:schemeClr val="dk1"/>
-              </a:buClr>
-              <a:buSzPts val="2800"/>
-              <a:buNone/>
-            </a:pPr>
-            <a:endParaRPr/>
-          </a:p>
-        </p:txBody>
-      </p:sp>
-    </p:spTree>
-  </p:cSld>
-  <p:clrMapOvr>
-    <a:masterClrMapping/>
-  </p:clrMapOvr>
-</p:sld>
-</file>
-
-<file path=ppt/slides/slide22.xml><?xml version="1.0" encoding="utf-8"?>
-<p:sld xmlns:a="http://schemas.openxmlformats.org/drawingml/2006/main" xmlns:r="http://schemas.openxmlformats.org/officeDocument/2006/relationships" xmlns:p="http://schemas.openxmlformats.org/presentationml/2006/main">
-  <p:cSld>
-    <p:spTree>
-      <p:nvGrpSpPr>
-        <p:cNvPr id="1" name="Shape 231"/>
-        <p:cNvGrpSpPr/>
-        <p:nvPr/>
-      </p:nvGrpSpPr>
-      <p:grpSpPr>
-        <a:xfrm>
-          <a:off x="0" y="0"/>
-          <a:ext cx="0" cy="0"/>
-          <a:chOff x="0" y="0"/>
-          <a:chExt cx="0" cy="0"/>
-        </a:xfrm>
-      </p:grpSpPr>
-      <p:sp>
-        <p:nvSpPr>
-          <p:cNvPr id="232" name="Google Shape;232;p34"/>
-          <p:cNvSpPr txBox="1">
-            <a:spLocks noGrp="1"/>
-          </p:cNvSpPr>
-          <p:nvPr>
-            <p:ph type="title"/>
-          </p:nvPr>
-        </p:nvSpPr>
-        <p:spPr>
-          <a:xfrm>
-            <a:off x="838200" y="365125"/>
-            <a:ext cx="10515600" cy="1325563"/>
-          </a:xfrm>
-          <a:prstGeom prst="rect">
-            <a:avLst/>
-          </a:prstGeom>
-          <a:noFill/>
-          <a:ln>
-            <a:noFill/>
-          </a:ln>
-        </p:spPr>
-        <p:txBody>
-          <a:bodyPr spcFirstLastPara="1" wrap="square" lIns="91425" tIns="45700" rIns="91425" bIns="45700" anchor="ctr" anchorCtr="0">
-            <a:normAutofit/>
-          </a:bodyPr>
-          <a:lstStyle/>
-          <a:p>
-            <a:pPr marL="0" lvl="0" indent="0" algn="l" rtl="0">
-              <a:lnSpc>
-                <a:spcPct val="90000"/>
-              </a:lnSpc>
-              <a:spcBef>
-                <a:spcPts val="0"/>
-              </a:spcBef>
-              <a:spcAft>
-                <a:spcPts val="0"/>
-              </a:spcAft>
-              <a:buClr>
-                <a:schemeClr val="dk1"/>
-              </a:buClr>
-              <a:buSzPts val="4400"/>
-              <a:buFont typeface="Calibri"/>
-              <a:buNone/>
-            </a:pPr>
-            <a:r>
-              <a:rPr lang="en-US"/>
-              <a:t>DL in Your Daily Life</a:t>
-            </a:r>
-            <a:endParaRPr/>
-          </a:p>
-        </p:txBody>
-      </p:sp>
-      <p:sp>
-        <p:nvSpPr>
-          <p:cNvPr id="233" name="Google Shape;233;p34"/>
-          <p:cNvSpPr txBox="1">
-            <a:spLocks noGrp="1"/>
-          </p:cNvSpPr>
-          <p:nvPr>
-            <p:ph type="body" idx="1"/>
-          </p:nvPr>
-        </p:nvSpPr>
-        <p:spPr>
-          <a:xfrm>
-            <a:off x="838200" y="1825625"/>
-            <a:ext cx="10515600" cy="4351338"/>
-          </a:xfrm>
-          <a:prstGeom prst="rect">
-            <a:avLst/>
-          </a:prstGeom>
-          <a:noFill/>
-          <a:ln>
-            <a:noFill/>
-          </a:ln>
-        </p:spPr>
-        <p:txBody>
-          <a:bodyPr spcFirstLastPara="1" wrap="square" lIns="91425" tIns="45700" rIns="91425" bIns="45700" anchor="t" anchorCtr="0">
-            <a:normAutofit/>
-          </a:bodyPr>
-          <a:lstStyle/>
-          <a:p>
-            <a:pPr marL="228600" lvl="0" indent="-228600" algn="l" rtl="0">
-              <a:lnSpc>
-                <a:spcPct val="90000"/>
-              </a:lnSpc>
-              <a:spcBef>
-                <a:spcPts val="0"/>
-              </a:spcBef>
-              <a:spcAft>
-                <a:spcPts val="0"/>
-              </a:spcAft>
-              <a:buClr>
-                <a:schemeClr val="dk1"/>
-              </a:buClr>
-              <a:buSzPts val="2800"/>
-              <a:buChar char="•"/>
-            </a:pPr>
-            <a:r>
-              <a:rPr lang="en-US"/>
-              <a:t>Autonomous Vehicles</a:t>
-            </a:r>
-            <a:endParaRPr/>
-          </a:p>
-          <a:p>
-            <a:pPr marL="228600" lvl="0" indent="-228600" algn="l" rtl="0">
-              <a:lnSpc>
-                <a:spcPct val="90000"/>
-              </a:lnSpc>
-              <a:spcBef>
-                <a:spcPts val="1000"/>
-              </a:spcBef>
-              <a:spcAft>
-                <a:spcPts val="0"/>
-              </a:spcAft>
-              <a:buClr>
-                <a:schemeClr val="dk1"/>
-              </a:buClr>
-              <a:buSzPts val="2800"/>
-              <a:buChar char="•"/>
-            </a:pPr>
-            <a:r>
-              <a:rPr lang="en-US"/>
-              <a:t>Speech Recognition</a:t>
-            </a:r>
-            <a:endParaRPr/>
-          </a:p>
-          <a:p>
-            <a:pPr marL="228600" lvl="0" indent="-228600" algn="l" rtl="0">
-              <a:lnSpc>
-                <a:spcPct val="90000"/>
-              </a:lnSpc>
-              <a:spcBef>
-                <a:spcPts val="1000"/>
-              </a:spcBef>
-              <a:spcAft>
-                <a:spcPts val="0"/>
-              </a:spcAft>
-              <a:buClr>
-                <a:schemeClr val="dk1"/>
-              </a:buClr>
-              <a:buSzPts val="2800"/>
-              <a:buChar char="•"/>
-            </a:pPr>
-            <a:r>
-              <a:rPr lang="en-US"/>
-              <a:t>Chatbots</a:t>
-            </a:r>
-            <a:endParaRPr/>
-          </a:p>
-          <a:p>
-            <a:pPr marL="228600" lvl="0" indent="-228600" algn="l" rtl="0">
-              <a:lnSpc>
-                <a:spcPct val="90000"/>
-              </a:lnSpc>
-              <a:spcBef>
-                <a:spcPts val="1000"/>
-              </a:spcBef>
-              <a:spcAft>
-                <a:spcPts val="0"/>
-              </a:spcAft>
-              <a:buClr>
-                <a:schemeClr val="dk1"/>
-              </a:buClr>
-              <a:buSzPts val="2800"/>
-              <a:buChar char="•"/>
-            </a:pPr>
-            <a:r>
-              <a:rPr lang="en-US"/>
-              <a:t>Google Translate using Video</a:t>
-            </a:r>
-            <a:endParaRPr/>
-          </a:p>
-          <a:p>
-            <a:pPr marL="228600" lvl="0" indent="-228600" algn="l" rtl="0">
-              <a:lnSpc>
-                <a:spcPct val="90000"/>
-              </a:lnSpc>
-              <a:spcBef>
-                <a:spcPts val="1000"/>
-              </a:spcBef>
-              <a:spcAft>
-                <a:spcPts val="0"/>
-              </a:spcAft>
-              <a:buClr>
-                <a:schemeClr val="dk1"/>
-              </a:buClr>
-              <a:buSzPts val="2800"/>
-              <a:buChar char="•"/>
-            </a:pPr>
-            <a:r>
-              <a:rPr lang="en-US"/>
-              <a:t>Subtitles on YouTube</a:t>
-            </a:r>
-            <a:endParaRPr/>
-          </a:p>
-          <a:p>
-            <a:pPr marL="228600" lvl="0" indent="-228600" algn="l" rtl="0">
-              <a:lnSpc>
-                <a:spcPct val="90000"/>
-              </a:lnSpc>
-              <a:spcBef>
-                <a:spcPts val="1000"/>
-              </a:spcBef>
-              <a:spcAft>
-                <a:spcPts val="0"/>
-              </a:spcAft>
-              <a:buClr>
-                <a:schemeClr val="dk1"/>
-              </a:buClr>
-              <a:buSzPts val="2800"/>
-              <a:buChar char="•"/>
-            </a:pPr>
-            <a:r>
-              <a:rPr lang="en-US"/>
-              <a:t>Apple Face ID</a:t>
-            </a:r>
-            <a:endParaRPr/>
-          </a:p>
-        </p:txBody>
-      </p:sp>
-    </p:spTree>
-  </p:cSld>
-  <p:clrMapOvr>
-    <a:masterClrMapping/>
-  </p:clrMapOvr>
-</p:sld>
-</file>
-
-<file path=ppt/slides/slide23.xml><?xml version="1.0" encoding="utf-8"?>
-<p:sld xmlns:a="http://schemas.openxmlformats.org/drawingml/2006/main" xmlns:r="http://schemas.openxmlformats.org/officeDocument/2006/relationships" xmlns:p="http://schemas.openxmlformats.org/presentationml/2006/main">
-  <p:cSld>
-    <p:spTree>
-      <p:nvGrpSpPr>
-        <p:cNvPr id="1" name="Shape 237"/>
-        <p:cNvGrpSpPr/>
-        <p:nvPr/>
-      </p:nvGrpSpPr>
-      <p:grpSpPr>
-        <a:xfrm>
-          <a:off x="0" y="0"/>
-          <a:ext cx="0" cy="0"/>
-          <a:chOff x="0" y="0"/>
-          <a:chExt cx="0" cy="0"/>
-        </a:xfrm>
-      </p:grpSpPr>
-      <p:sp>
-        <p:nvSpPr>
-          <p:cNvPr id="238" name="Google Shape;238;p35"/>
-          <p:cNvSpPr txBox="1">
-            <a:spLocks noGrp="1"/>
-          </p:cNvSpPr>
-          <p:nvPr>
-            <p:ph type="title"/>
-          </p:nvPr>
-        </p:nvSpPr>
-        <p:spPr>
-          <a:xfrm>
-            <a:off x="838200" y="365125"/>
-            <a:ext cx="10515600" cy="1325563"/>
-          </a:xfrm>
-          <a:prstGeom prst="rect">
-            <a:avLst/>
-          </a:prstGeom>
-          <a:noFill/>
-          <a:ln>
-            <a:noFill/>
-          </a:ln>
-        </p:spPr>
-        <p:txBody>
-          <a:bodyPr spcFirstLastPara="1" wrap="square" lIns="91425" tIns="45700" rIns="91425" bIns="45700" anchor="ctr" anchorCtr="0">
-            <a:noAutofit/>
-          </a:bodyPr>
-          <a:lstStyle/>
-          <a:p>
-            <a:pPr marL="0" lvl="0" indent="0" algn="l" rtl="0">
-              <a:lnSpc>
-                <a:spcPct val="90000"/>
-              </a:lnSpc>
-              <a:spcBef>
-                <a:spcPts val="0"/>
-              </a:spcBef>
-              <a:spcAft>
-                <a:spcPts val="0"/>
-              </a:spcAft>
-              <a:buClr>
-                <a:schemeClr val="dk1"/>
-              </a:buClr>
-              <a:buSzPts val="4400"/>
-              <a:buFont typeface="Calibri"/>
-              <a:buNone/>
-            </a:pPr>
-            <a:r>
-              <a:rPr lang="en-US"/>
-              <a:t>IoT: what is it?</a:t>
-            </a:r>
-            <a:endParaRPr/>
-          </a:p>
-        </p:txBody>
-      </p:sp>
-      <p:sp>
-        <p:nvSpPr>
-          <p:cNvPr id="239" name="Google Shape;239;p35"/>
-          <p:cNvSpPr txBox="1">
-            <a:spLocks noGrp="1"/>
-          </p:cNvSpPr>
-          <p:nvPr>
-            <p:ph type="body" idx="1"/>
-          </p:nvPr>
-        </p:nvSpPr>
-        <p:spPr>
-          <a:xfrm>
-            <a:off x="838200" y="1825625"/>
-            <a:ext cx="10515600" cy="4351338"/>
-          </a:xfrm>
-          <a:prstGeom prst="rect">
-            <a:avLst/>
-          </a:prstGeom>
-          <a:noFill/>
-          <a:ln>
-            <a:noFill/>
-          </a:ln>
-        </p:spPr>
-        <p:txBody>
-          <a:bodyPr spcFirstLastPara="1" wrap="square" lIns="91425" tIns="45700" rIns="91425" bIns="45700" anchor="t" anchorCtr="0">
-            <a:normAutofit/>
-          </a:bodyPr>
-          <a:lstStyle/>
-          <a:p>
-            <a:pPr marL="228600" lvl="0" indent="-228600" algn="l" rtl="0">
-              <a:lnSpc>
-                <a:spcPct val="90000"/>
-              </a:lnSpc>
-              <a:spcBef>
-                <a:spcPts val="0"/>
-              </a:spcBef>
-              <a:spcAft>
-                <a:spcPts val="0"/>
-              </a:spcAft>
-              <a:buClr>
-                <a:schemeClr val="dk1"/>
-              </a:buClr>
-              <a:buSzPts val="2800"/>
-              <a:buChar char="•"/>
-            </a:pPr>
-            <a:r>
-              <a:rPr lang="en-US"/>
-              <a:t>Internet of “Things”</a:t>
-            </a:r>
-            <a:endParaRPr/>
-          </a:p>
-          <a:p>
-            <a:pPr marL="228600" lvl="0" indent="-228600" algn="l" rtl="0">
-              <a:lnSpc>
-                <a:spcPct val="90000"/>
-              </a:lnSpc>
-              <a:spcBef>
-                <a:spcPts val="1000"/>
-              </a:spcBef>
-              <a:spcAft>
-                <a:spcPts val="0"/>
-              </a:spcAft>
-              <a:buClr>
-                <a:schemeClr val="dk1"/>
-              </a:buClr>
-              <a:buSzPts val="2800"/>
-              <a:buChar char="•"/>
-            </a:pPr>
-            <a:r>
-              <a:rPr lang="en-US"/>
-              <a:t>“Things” were originally meant to be low-power, dumb</a:t>
-            </a:r>
-            <a:endParaRPr/>
-          </a:p>
-          <a:p>
-            <a:pPr marL="685800" lvl="1" indent="-228600" algn="l" rtl="0">
-              <a:lnSpc>
-                <a:spcPct val="90000"/>
-              </a:lnSpc>
-              <a:spcBef>
-                <a:spcPts val="500"/>
-              </a:spcBef>
-              <a:spcAft>
-                <a:spcPts val="0"/>
-              </a:spcAft>
-              <a:buClr>
-                <a:schemeClr val="dk1"/>
-              </a:buClr>
-              <a:buSzPts val="2400"/>
-              <a:buChar char="•"/>
-            </a:pPr>
-            <a:r>
-              <a:rPr lang="en-US"/>
-              <a:t>Aka “Sensors”</a:t>
-            </a:r>
-            <a:endParaRPr/>
-          </a:p>
-          <a:p>
-            <a:pPr marL="228600" lvl="0" indent="-228600" algn="l" rtl="0">
-              <a:lnSpc>
-                <a:spcPct val="90000"/>
-              </a:lnSpc>
-              <a:spcBef>
-                <a:spcPts val="1000"/>
-              </a:spcBef>
-              <a:spcAft>
-                <a:spcPts val="0"/>
-              </a:spcAft>
-              <a:buClr>
-                <a:schemeClr val="dk1"/>
-              </a:buClr>
-              <a:buSzPts val="2800"/>
-              <a:buChar char="•"/>
-            </a:pPr>
-            <a:r>
-              <a:rPr lang="en-US"/>
-              <a:t>Embedded OSes</a:t>
-            </a:r>
-            <a:endParaRPr/>
-          </a:p>
-          <a:p>
-            <a:pPr marL="228600" lvl="0" indent="-228600" algn="l" rtl="0">
-              <a:lnSpc>
-                <a:spcPct val="90000"/>
-              </a:lnSpc>
-              <a:spcBef>
-                <a:spcPts val="1000"/>
-              </a:spcBef>
-              <a:spcAft>
-                <a:spcPts val="0"/>
-              </a:spcAft>
-              <a:buClr>
-                <a:schemeClr val="dk1"/>
-              </a:buClr>
-              <a:buSzPts val="2800"/>
-              <a:buChar char="•"/>
-            </a:pPr>
-            <a:r>
-              <a:rPr lang="en-US"/>
-              <a:t>Arcane protocols</a:t>
-            </a:r>
-            <a:endParaRPr/>
-          </a:p>
-          <a:p>
-            <a:pPr marL="228600" lvl="0" indent="-228600" algn="l" rtl="0">
-              <a:lnSpc>
-                <a:spcPct val="90000"/>
-              </a:lnSpc>
-              <a:spcBef>
-                <a:spcPts val="1000"/>
-              </a:spcBef>
-              <a:spcAft>
-                <a:spcPts val="0"/>
-              </a:spcAft>
-              <a:buClr>
-                <a:schemeClr val="dk1"/>
-              </a:buClr>
-              <a:buSzPts val="2800"/>
-              <a:buChar char="•"/>
-            </a:pPr>
-            <a:r>
-              <a:rPr lang="en-US"/>
-              <a:t>“Things” mostly read-only</a:t>
-            </a:r>
-            <a:endParaRPr/>
-          </a:p>
-          <a:p>
-            <a:pPr marL="228600" lvl="0" indent="-228600" algn="l" rtl="0">
-              <a:lnSpc>
-                <a:spcPct val="90000"/>
-              </a:lnSpc>
-              <a:spcBef>
-                <a:spcPts val="1000"/>
-              </a:spcBef>
-              <a:spcAft>
-                <a:spcPts val="0"/>
-              </a:spcAft>
-              <a:buClr>
-                <a:schemeClr val="dk1"/>
-              </a:buClr>
-              <a:buSzPts val="2800"/>
-              <a:buChar char="•"/>
-            </a:pPr>
-            <a:r>
-              <a:rPr lang="en-US"/>
-              <a:t>“Things” send to “gateways”</a:t>
-            </a:r>
-            <a:endParaRPr/>
-          </a:p>
-        </p:txBody>
-      </p:sp>
-    </p:spTree>
-  </p:cSld>
-  <p:clrMapOvr>
-    <a:masterClrMapping/>
-  </p:clrMapOvr>
-</p:sld>
-</file>
-
-<file path=ppt/slides/slide24.xml><?xml version="1.0" encoding="utf-8"?>
-<p:sld xmlns:a="http://schemas.openxmlformats.org/drawingml/2006/main" xmlns:r="http://schemas.openxmlformats.org/officeDocument/2006/relationships" xmlns:p="http://schemas.openxmlformats.org/presentationml/2006/main">
-  <p:cSld>
-    <p:spTree>
-      <p:nvGrpSpPr>
         <p:cNvPr id="1" name="Shape 243"/>
         <p:cNvGrpSpPr/>
         <p:nvPr/>
@@ -19496,159 +18449,7 @@
 </p:sld>
 </file>
 
-<file path=ppt/slides/slide25.xml><?xml version="1.0" encoding="utf-8"?>
-<p:sld xmlns:a="http://schemas.openxmlformats.org/drawingml/2006/main" xmlns:r="http://schemas.openxmlformats.org/officeDocument/2006/relationships" xmlns:p="http://schemas.openxmlformats.org/presentationml/2006/main">
-  <p:cSld>
-    <p:spTree>
-      <p:nvGrpSpPr>
-        <p:cNvPr id="1" name="Shape 249"/>
-        <p:cNvGrpSpPr/>
-        <p:nvPr/>
-      </p:nvGrpSpPr>
-      <p:grpSpPr>
-        <a:xfrm>
-          <a:off x="0" y="0"/>
-          <a:ext cx="0" cy="0"/>
-          <a:chOff x="0" y="0"/>
-          <a:chExt cx="0" cy="0"/>
-        </a:xfrm>
-      </p:grpSpPr>
-      <p:sp>
-        <p:nvSpPr>
-          <p:cNvPr id="250" name="Google Shape;250;p37"/>
-          <p:cNvSpPr txBox="1">
-            <a:spLocks noGrp="1"/>
-          </p:cNvSpPr>
-          <p:nvPr>
-            <p:ph type="title"/>
-          </p:nvPr>
-        </p:nvSpPr>
-        <p:spPr>
-          <a:xfrm>
-            <a:off x="838200" y="365125"/>
-            <a:ext cx="10515600" cy="1325563"/>
-          </a:xfrm>
-          <a:prstGeom prst="rect">
-            <a:avLst/>
-          </a:prstGeom>
-          <a:noFill/>
-          <a:ln>
-            <a:noFill/>
-          </a:ln>
-        </p:spPr>
-        <p:txBody>
-          <a:bodyPr spcFirstLastPara="1" wrap="square" lIns="91425" tIns="45700" rIns="91425" bIns="45700" anchor="ctr" anchorCtr="0">
-            <a:normAutofit/>
-          </a:bodyPr>
-          <a:lstStyle/>
-          <a:p>
-            <a:pPr marL="0" lvl="0" indent="0" algn="l" rtl="0">
-              <a:lnSpc>
-                <a:spcPct val="90000"/>
-              </a:lnSpc>
-              <a:spcBef>
-                <a:spcPts val="0"/>
-              </a:spcBef>
-              <a:spcAft>
-                <a:spcPts val="0"/>
-              </a:spcAft>
-              <a:buClr>
-                <a:schemeClr val="dk1"/>
-              </a:buClr>
-              <a:buSzPts val="4400"/>
-              <a:buFont typeface="Calibri"/>
-              <a:buNone/>
-            </a:pPr>
-            <a:r>
-              <a:rPr lang="en-US"/>
-              <a:t>NVIDIA Jetson Systems</a:t>
-            </a:r>
-            <a:endParaRPr/>
-          </a:p>
-        </p:txBody>
-      </p:sp>
-      <p:sp>
-        <p:nvSpPr>
-          <p:cNvPr id="251" name="Google Shape;251;p37"/>
-          <p:cNvSpPr txBox="1">
-            <a:spLocks noGrp="1"/>
-          </p:cNvSpPr>
-          <p:nvPr>
-            <p:ph type="body" idx="1"/>
-          </p:nvPr>
-        </p:nvSpPr>
-        <p:spPr>
-          <a:xfrm>
-            <a:off x="838200" y="1825625"/>
-            <a:ext cx="10515600" cy="4351338"/>
-          </a:xfrm>
-          <a:prstGeom prst="rect">
-            <a:avLst/>
-          </a:prstGeom>
-          <a:noFill/>
-          <a:ln>
-            <a:noFill/>
-          </a:ln>
-        </p:spPr>
-        <p:txBody>
-          <a:bodyPr spcFirstLastPara="1" wrap="square" lIns="91425" tIns="45700" rIns="91425" bIns="45700" anchor="t" anchorCtr="0">
-            <a:normAutofit/>
-          </a:bodyPr>
-          <a:lstStyle/>
-          <a:p>
-            <a:pPr marL="228600" lvl="0" indent="-228600" algn="l" rtl="0">
-              <a:lnSpc>
-                <a:spcPct val="90000"/>
-              </a:lnSpc>
-              <a:spcBef>
-                <a:spcPts val="1000"/>
-              </a:spcBef>
-              <a:spcAft>
-                <a:spcPts val="0"/>
-              </a:spcAft>
-              <a:buClr>
-                <a:schemeClr val="dk1"/>
-              </a:buClr>
-              <a:buSzPts val="2800"/>
-              <a:buChar char="•"/>
-            </a:pPr>
-            <a:r>
-              <a:rPr lang="en-US"/>
-              <a:t>Xavier NX</a:t>
-            </a:r>
-            <a:endParaRPr/>
-          </a:p>
-          <a:p>
-            <a:pPr marL="228600" lvl="0" indent="-165100" algn="l" rtl="0">
-              <a:lnSpc>
-                <a:spcPct val="90000"/>
-              </a:lnSpc>
-              <a:spcBef>
-                <a:spcPts val="1000"/>
-              </a:spcBef>
-              <a:spcAft>
-                <a:spcPts val="0"/>
-              </a:spcAft>
-              <a:buSzPts val="1800"/>
-              <a:buChar char="•"/>
-            </a:pPr>
-            <a:r>
-              <a:rPr lang="en-US"/>
-              <a:t>Xavier AGX</a:t>
-            </a:r>
-            <a:endParaRPr/>
-          </a:p>
-        </p:txBody>
-      </p:sp>
-    </p:spTree>
-  </p:cSld>
-  <p:clrMapOvr>
-    <a:masterClrMapping/>
-  </p:clrMapOvr>
-</p:sld>
-</file>
-
-<file path=ppt/slides/slide26.xml><?xml version="1.0" encoding="utf-8"?>
+<file path=ppt/slides/slide21.xml><?xml version="1.0" encoding="utf-8"?>
 <p:sld xmlns:a="http://schemas.openxmlformats.org/drawingml/2006/main" xmlns:r="http://schemas.openxmlformats.org/officeDocument/2006/relationships" xmlns:p="http://schemas.openxmlformats.org/presentationml/2006/main">
   <p:cSld>
     <p:spTree>
@@ -19954,7 +18755,7 @@
 </p:sld>
 </file>
 
-<file path=ppt/slides/slide27.xml><?xml version="1.0" encoding="utf-8"?>
+<file path=ppt/slides/slide22.xml><?xml version="1.0" encoding="utf-8"?>
 <p:sld xmlns:a="http://schemas.openxmlformats.org/drawingml/2006/main" xmlns:r="http://schemas.openxmlformats.org/officeDocument/2006/relationships" xmlns:p="http://schemas.openxmlformats.org/presentationml/2006/main">
   <p:cSld>
     <p:spTree>
@@ -20132,7 +18933,7 @@
 </p:sld>
 </file>
 
-<file path=ppt/slides/slide28.xml><?xml version="1.0" encoding="utf-8"?>
+<file path=ppt/slides/slide23.xml><?xml version="1.0" encoding="utf-8"?>
 <p:sld xmlns:a="http://schemas.openxmlformats.org/drawingml/2006/main" xmlns:r="http://schemas.openxmlformats.org/officeDocument/2006/relationships" xmlns:p="http://schemas.openxmlformats.org/presentationml/2006/main">
   <p:cSld>
     <p:spTree>
@@ -20348,10 +19149,10 @@
               <a:buNone/>
             </a:pPr>
             <a:r>
-              <a:rPr lang="en-US"/>
-              <a:t>AI / DL and Cloud News</a:t>
+              <a:rPr lang="en-US" dirty="0"/>
+              <a:t>AI News</a:t>
             </a:r>
-            <a:endParaRPr/>
+            <a:endParaRPr dirty="0"/>
           </a:p>
         </p:txBody>
       </p:sp>
@@ -20627,7 +19428,7 @@
         </p:spPr>
         <p:txBody>
           <a:bodyPr spcFirstLastPara="1" wrap="square" lIns="91425" tIns="45700" rIns="91425" bIns="45700" anchor="t" anchorCtr="0">
-            <a:normAutofit lnSpcReduction="10000"/>
+            <a:normAutofit fontScale="92500" lnSpcReduction="20000"/>
           </a:bodyPr>
           <a:lstStyle/>
           <a:p>
@@ -20648,10 +19449,10 @@
               <a:buChar char="•"/>
             </a:pPr>
             <a:r>
-              <a:rPr lang="en-US"/>
+              <a:rPr lang="en-US" dirty="0"/>
               <a:t>Large part of grade</a:t>
             </a:r>
-            <a:endParaRPr/>
+            <a:endParaRPr dirty="0"/>
           </a:p>
           <a:p>
             <a:pPr marL="228600" lvl="0" indent="-228600" algn="l" rtl="0">
@@ -20671,10 +19472,22 @@
               <a:buChar char="•"/>
             </a:pPr>
             <a:r>
-              <a:rPr lang="en-US"/>
-              <a:t>Form teams of 3 to 4 people</a:t>
+              <a:rPr lang="en-US" dirty="0"/>
+              <a:t>Form teams of 3 -5 people</a:t>
             </a:r>
-            <a:endParaRPr/>
+          </a:p>
+          <a:p>
+            <a:pPr marL="685800" lvl="1" indent="-228600">
+              <a:spcBef>
+                <a:spcPts val="1000"/>
+              </a:spcBef>
+              <a:buSzPts val="2800"/>
+            </a:pPr>
+            <a:r>
+              <a:rPr lang="en-US" dirty="0"/>
+              <a:t>Across sections typically OK but do ask the instructor</a:t>
+            </a:r>
+            <a:endParaRPr dirty="0"/>
           </a:p>
           <a:p>
             <a:pPr marL="228600" lvl="0" indent="-228600" algn="l" rtl="0">
@@ -20694,10 +19507,10 @@
               <a:buChar char="•"/>
             </a:pPr>
             <a:r>
-              <a:rPr lang="en-US"/>
+              <a:rPr lang="en-US" dirty="0"/>
               <a:t>Leverage Big Data, Cloud, DL, and the edge device</a:t>
             </a:r>
-            <a:endParaRPr/>
+            <a:endParaRPr dirty="0"/>
           </a:p>
           <a:p>
             <a:pPr marL="685800" lvl="1" indent="-228600" algn="l" rtl="0">
@@ -20717,10 +19530,10 @@
               <a:buChar char="•"/>
             </a:pPr>
             <a:r>
-              <a:rPr lang="en-US"/>
+              <a:rPr lang="en-US" dirty="0"/>
               <a:t>Should be more than you can do just on a workstation</a:t>
             </a:r>
-            <a:endParaRPr/>
+            <a:endParaRPr dirty="0"/>
           </a:p>
           <a:p>
             <a:pPr marL="685800" lvl="1" indent="-190500" algn="l" rtl="0">
@@ -20737,10 +19550,10 @@
               <a:buChar char="•"/>
             </a:pPr>
             <a:r>
-              <a:rPr lang="en-US"/>
+              <a:rPr lang="en-US" dirty="0"/>
               <a:t>Typically, modeled after an existing class of problems (e.g. NLP.. object detection…)</a:t>
             </a:r>
-            <a:endParaRPr/>
+            <a:endParaRPr dirty="0"/>
           </a:p>
           <a:p>
             <a:pPr marL="685800" lvl="1" indent="-190500" algn="l" rtl="0">
@@ -20757,10 +19570,18 @@
               <a:buChar char="•"/>
             </a:pPr>
             <a:r>
-              <a:rPr lang="en-US"/>
-              <a:t>Check arxiv / conference workshops!</a:t>
+              <a:rPr lang="en-US" dirty="0"/>
+              <a:t>Check </a:t>
             </a:r>
-            <a:endParaRPr/>
+            <a:r>
+              <a:rPr lang="en-US" dirty="0" err="1"/>
+              <a:t>arxiv</a:t>
+            </a:r>
+            <a:r>
+              <a:rPr lang="en-US" dirty="0"/>
+              <a:t> / conference workshops!</a:t>
+            </a:r>
+            <a:endParaRPr dirty="0"/>
           </a:p>
           <a:p>
             <a:pPr marL="685800" lvl="1" indent="-190500" algn="l" rtl="0">
@@ -20777,10 +19598,10 @@
               <a:buChar char="•"/>
             </a:pPr>
             <a:r>
-              <a:rPr lang="en-US"/>
-              <a:t>ideally, collect your own dataset - the format may borrow from existing</a:t>
+              <a:rPr lang="en-US" dirty="0"/>
+              <a:t>Collect your own dataset (alternatively find some new ones!)</a:t>
             </a:r>
-            <a:endParaRPr/>
+            <a:endParaRPr dirty="0"/>
           </a:p>
           <a:p>
             <a:pPr marL="685800" lvl="1" indent="-190500" algn="l" rtl="0">
@@ -20797,10 +19618,23 @@
               <a:buChar char="•"/>
             </a:pPr>
             <a:r>
-              <a:rPr lang="en-US"/>
-              <a:t>Ok to reuse existing model architecture but best to choose between them</a:t>
+              <a:rPr lang="en-US" dirty="0"/>
+              <a:t>Best to reuse an existing model architecture </a:t>
             </a:r>
-            <a:endParaRPr/>
+          </a:p>
+          <a:p>
+            <a:pPr marL="1143000" lvl="2" indent="-190500"/>
+            <a:r>
+              <a:rPr lang="en-US" dirty="0"/>
+              <a:t>Okay to invent your own but generally that’s out of scope</a:t>
+            </a:r>
+          </a:p>
+          <a:p>
+            <a:pPr marL="1143000" lvl="2" indent="-190500"/>
+            <a:r>
+              <a:rPr lang="en-US" dirty="0"/>
+              <a:t>Use transfer learning</a:t>
+            </a:r>
           </a:p>
           <a:p>
             <a:pPr marL="685800" lvl="1" indent="-190500" algn="l" rtl="0">
@@ -20817,10 +19651,14 @@
               <a:buChar char="•"/>
             </a:pPr>
             <a:r>
-              <a:rPr lang="en-US"/>
-              <a:t>Ideally, train your model on your dataset</a:t>
+              <a:rPr lang="en-US" dirty="0"/>
+              <a:t>Train the model on your dataset </a:t>
             </a:r>
-            <a:endParaRPr/>
+            <a:r>
+              <a:rPr lang="en-US" i="1" dirty="0"/>
+              <a:t>in the cloud</a:t>
+            </a:r>
+            <a:endParaRPr i="1" dirty="0"/>
           </a:p>
           <a:p>
             <a:pPr marL="685800" lvl="1" indent="-190500" algn="l" rtl="0">
@@ -20837,10 +19675,29 @@
               <a:buChar char="•"/>
             </a:pPr>
             <a:r>
-              <a:rPr lang="en-US"/>
-              <a:t>Ideally, implement runtime on the jetson </a:t>
+              <a:rPr lang="en-US" dirty="0"/>
+              <a:t>Implement model runtime / inference on the jetson edge device</a:t>
             </a:r>
-            <a:endParaRPr/>
+          </a:p>
+          <a:p>
+            <a:pPr marL="685800" lvl="1" indent="-190500" algn="l" rtl="0">
+              <a:lnSpc>
+                <a:spcPct val="90000"/>
+              </a:lnSpc>
+              <a:spcBef>
+                <a:spcPts val="500"/>
+              </a:spcBef>
+              <a:spcAft>
+                <a:spcPts val="0"/>
+              </a:spcAft>
+              <a:buSzPts val="1800"/>
+              <a:buChar char="•"/>
+            </a:pPr>
+            <a:r>
+              <a:rPr lang="en-US" dirty="0"/>
+              <a:t>Shoot for an end to end architecture</a:t>
+            </a:r>
+            <a:endParaRPr dirty="0"/>
           </a:p>
           <a:p>
             <a:pPr marL="0" lvl="0" indent="0" algn="l" rtl="0">
@@ -20859,7 +19716,7 @@
               <a:buSzPts val="2800"/>
               <a:buNone/>
             </a:pPr>
-            <a:endParaRPr/>
+            <a:endParaRPr dirty="0"/>
           </a:p>
         </p:txBody>
       </p:sp>
@@ -20967,7 +19824,7 @@
         </p:spPr>
         <p:txBody>
           <a:bodyPr spcFirstLastPara="1" wrap="square" lIns="91425" tIns="45700" rIns="91425" bIns="45700" anchor="t" anchorCtr="0">
-            <a:normAutofit/>
+            <a:normAutofit lnSpcReduction="10000"/>
           </a:bodyPr>
           <a:lstStyle/>
           <a:p>
@@ -20989,7 +19846,51 @@
             </a:pPr>
             <a:r>
               <a:rPr lang="en-US" dirty="0"/>
-              <a:t>Leverage a dataset of a missing persons</a:t>
+              <a:t>Find a new a dataset of a missing persons</a:t>
+            </a:r>
+          </a:p>
+          <a:p>
+            <a:pPr marL="228600" lvl="0" indent="-228600" algn="l" rtl="0">
+              <a:lnSpc>
+                <a:spcPct val="90000"/>
+              </a:lnSpc>
+              <a:spcBef>
+                <a:spcPts val="0"/>
+              </a:spcBef>
+              <a:spcAft>
+                <a:spcPts val="0"/>
+              </a:spcAft>
+              <a:buClr>
+                <a:schemeClr val="dk1"/>
+              </a:buClr>
+              <a:buSzPts val="2800"/>
+              <a:buChar char="•"/>
+            </a:pPr>
+            <a:r>
+              <a:rPr lang="en-US" dirty="0"/>
+              <a:t>Select an existing object detector architecture</a:t>
+            </a:r>
+          </a:p>
+          <a:p>
+            <a:pPr marL="228600" lvl="0" indent="-228600" algn="l" rtl="0">
+              <a:lnSpc>
+                <a:spcPct val="90000"/>
+              </a:lnSpc>
+              <a:spcBef>
+                <a:spcPts val="0"/>
+              </a:spcBef>
+              <a:spcAft>
+                <a:spcPts val="0"/>
+              </a:spcAft>
+              <a:buClr>
+                <a:schemeClr val="dk1"/>
+              </a:buClr>
+              <a:buSzPts val="2800"/>
+              <a:buChar char="•"/>
+            </a:pPr>
+            <a:r>
+              <a:rPr lang="en-US" dirty="0"/>
+              <a:t>Download pre-trained weights</a:t>
             </a:r>
             <a:endParaRPr dirty="0"/>
           </a:p>
@@ -21012,7 +19913,7 @@
             </a:pPr>
             <a:r>
               <a:rPr lang="en-US" dirty="0"/>
-              <a:t>Train a model in the cloud to recognize the missing persons</a:t>
+              <a:t>Finetune the model in the cloud on your dataset[s] to recognize the missing persons</a:t>
             </a:r>
             <a:endParaRPr dirty="0"/>
           </a:p>
@@ -21035,7 +19936,29 @@
             </a:pPr>
             <a:r>
               <a:rPr lang="en-US" dirty="0"/>
-              <a:t>Deploy the model to your edge device</a:t>
+              <a:t>Deploy the finetuned model to your edge device</a:t>
+            </a:r>
+          </a:p>
+          <a:p>
+            <a:pPr marL="228600" lvl="0" indent="-228600" algn="l" rtl="0">
+              <a:lnSpc>
+                <a:spcPct val="90000"/>
+              </a:lnSpc>
+              <a:spcBef>
+                <a:spcPts val="1000"/>
+              </a:spcBef>
+              <a:spcAft>
+                <a:spcPts val="0"/>
+              </a:spcAft>
+              <a:buClr>
+                <a:schemeClr val="dk1"/>
+              </a:buClr>
+              <a:buSzPts val="2800"/>
+              <a:buChar char="•"/>
+            </a:pPr>
+            <a:r>
+              <a:rPr lang="en-US" dirty="0"/>
+              <a:t>Make sure it runs very well there (frame rate)</a:t>
             </a:r>
             <a:endParaRPr dirty="0"/>
           </a:p>
@@ -21078,7 +20001,7 @@
             </a:pPr>
             <a:r>
               <a:rPr lang="en-US" dirty="0"/>
-              <a:t>Service? Runtime application?</a:t>
+              <a:t>Make a Service? What does the runtime application look like?</a:t>
             </a:r>
             <a:endParaRPr dirty="0"/>
           </a:p>
@@ -21456,10 +20379,10 @@
               <a:buNone/>
             </a:pPr>
             <a:r>
-              <a:rPr lang="en-US"/>
-              <a:t>At a glance.. </a:t>
+              <a:rPr lang="en-US" dirty="0"/>
+              <a:t>Class at a glance.. </a:t>
             </a:r>
-            <a:endParaRPr/>
+            <a:endParaRPr dirty="0"/>
           </a:p>
         </p:txBody>
       </p:sp>
@@ -21484,13 +20407,13 @@
         </p:spPr>
         <p:txBody>
           <a:bodyPr spcFirstLastPara="1" wrap="square" lIns="91425" tIns="45700" rIns="91425" bIns="45700" anchor="t" anchorCtr="0">
-            <a:normAutofit/>
+            <a:normAutofit fontScale="55000" lnSpcReduction="20000"/>
           </a:bodyPr>
           <a:lstStyle/>
           <a:p>
             <a:pPr marL="457200" lvl="0" indent="-336550" algn="l" rtl="0">
               <a:lnSpc>
-                <a:spcPct val="70000"/>
+                <a:spcPct val="150000"/>
               </a:lnSpc>
               <a:spcBef>
                 <a:spcPts val="1000"/>
@@ -21503,14 +20426,14 @@
             </a:pPr>
             <a:r>
               <a:rPr lang="en-US" sz="2700" dirty="0"/>
-              <a:t>Intro and setup of the NX</a:t>
+              <a:t>Intro and setup of the Jetson device</a:t>
             </a:r>
             <a:endParaRPr sz="2700" dirty="0"/>
           </a:p>
           <a:p>
             <a:pPr marL="457200" lvl="0" indent="-336550" algn="l" rtl="0">
               <a:lnSpc>
-                <a:spcPct val="70000"/>
+                <a:spcPct val="150000"/>
               </a:lnSpc>
               <a:spcBef>
                 <a:spcPts val="0"/>
@@ -21523,14 +20446,14 @@
             </a:pPr>
             <a:r>
               <a:rPr lang="en-US" sz="2700" dirty="0"/>
-              <a:t>Cloud: IaaS, SaaS</a:t>
+              <a:t>Cloud: Infrastructure as a Service, Software as a Service</a:t>
             </a:r>
             <a:endParaRPr sz="2700" dirty="0"/>
           </a:p>
           <a:p>
             <a:pPr marL="457200" lvl="0" indent="-336550" algn="l" rtl="0">
               <a:lnSpc>
-                <a:spcPct val="70000"/>
+                <a:spcPct val="150000"/>
               </a:lnSpc>
               <a:spcBef>
                 <a:spcPts val="0"/>
@@ -21550,7 +20473,7 @@
           <a:p>
             <a:pPr marL="457200" lvl="0" indent="-336550" algn="l" rtl="0">
               <a:lnSpc>
-                <a:spcPct val="70000"/>
+                <a:spcPct val="150000"/>
               </a:lnSpc>
               <a:spcBef>
                 <a:spcPts val="0"/>
@@ -21563,14 +20486,14 @@
             </a:pPr>
             <a:r>
               <a:rPr lang="en-US" sz="2700" dirty="0"/>
-              <a:t>DL 101</a:t>
+              <a:t>Deep Learning 101</a:t>
             </a:r>
             <a:endParaRPr sz="2700" dirty="0"/>
           </a:p>
           <a:p>
             <a:pPr marL="457200" lvl="0" indent="-336550" algn="l" rtl="0">
               <a:lnSpc>
-                <a:spcPct val="70000"/>
+                <a:spcPct val="150000"/>
               </a:lnSpc>
               <a:spcBef>
                 <a:spcPts val="0"/>
@@ -21583,14 +20506,14 @@
             </a:pPr>
             <a:r>
               <a:rPr lang="en-US" sz="2700" dirty="0"/>
-              <a:t>DL Frameworks</a:t>
+              <a:t>Deep Learning Frameworks</a:t>
             </a:r>
             <a:endParaRPr sz="2700" dirty="0"/>
           </a:p>
           <a:p>
             <a:pPr marL="457200" lvl="0" indent="-336550" algn="l" rtl="0">
               <a:lnSpc>
-                <a:spcPct val="70000"/>
+                <a:spcPct val="150000"/>
               </a:lnSpc>
               <a:spcBef>
                 <a:spcPts val="0"/>
@@ -21610,7 +20533,7 @@
           <a:p>
             <a:pPr marL="457200" lvl="0" indent="-336550" algn="l" rtl="0">
               <a:lnSpc>
-                <a:spcPct val="70000"/>
+                <a:spcPct val="150000"/>
               </a:lnSpc>
               <a:spcBef>
                 <a:spcPts val="0"/>
@@ -21623,14 +20546,14 @@
             </a:pPr>
             <a:r>
               <a:rPr lang="en-US" sz="2700" dirty="0"/>
-              <a:t>DL 201</a:t>
+              <a:t>Deep Learning 201</a:t>
             </a:r>
             <a:endParaRPr sz="2700" dirty="0"/>
           </a:p>
           <a:p>
             <a:pPr marL="457200" lvl="0" indent="-336550" algn="l" rtl="0">
               <a:lnSpc>
-                <a:spcPct val="70000"/>
+                <a:spcPct val="150000"/>
               </a:lnSpc>
               <a:spcBef>
                 <a:spcPts val="0"/>
@@ -21650,7 +20573,7 @@
           <a:p>
             <a:pPr marL="457200" lvl="0" indent="-336550" algn="l" rtl="0">
               <a:lnSpc>
-                <a:spcPct val="70000"/>
+                <a:spcPct val="150000"/>
               </a:lnSpc>
               <a:spcBef>
                 <a:spcPts val="0"/>
@@ -21663,14 +20586,14 @@
             </a:pPr>
             <a:r>
               <a:rPr lang="en-US" sz="2700" dirty="0"/>
-              <a:t>MNMG</a:t>
+              <a:t>HPC and Multi-node Multi-GPU training</a:t>
             </a:r>
             <a:endParaRPr sz="2700" dirty="0"/>
           </a:p>
           <a:p>
             <a:pPr marL="457200" lvl="0" indent="-336550" algn="l" rtl="0">
               <a:lnSpc>
-                <a:spcPct val="70000"/>
+                <a:spcPct val="150000"/>
               </a:lnSpc>
               <a:spcBef>
                 <a:spcPts val="0"/>
@@ -21683,14 +20606,14 @@
             </a:pPr>
             <a:r>
               <a:rPr lang="en-US" sz="2700" dirty="0"/>
-              <a:t>GANs</a:t>
+              <a:t>Generative Adversarial Networks</a:t>
             </a:r>
             <a:endParaRPr sz="2700" dirty="0"/>
           </a:p>
           <a:p>
             <a:pPr marL="457200" lvl="0" indent="-336550" algn="l" rtl="0">
               <a:lnSpc>
-                <a:spcPct val="70000"/>
+                <a:spcPct val="150000"/>
               </a:lnSpc>
               <a:spcBef>
                 <a:spcPts val="0"/>
@@ -21703,14 +20626,14 @@
             </a:pPr>
             <a:r>
               <a:rPr lang="en-US" sz="2700" dirty="0"/>
-              <a:t>DRL</a:t>
+              <a:t>Deep Reinforcement Learning</a:t>
             </a:r>
             <a:endParaRPr sz="2700" dirty="0"/>
           </a:p>
           <a:p>
             <a:pPr marL="457200" lvl="0" indent="-336550" algn="l" rtl="0">
               <a:lnSpc>
-                <a:spcPct val="70000"/>
+                <a:spcPct val="150000"/>
               </a:lnSpc>
               <a:spcBef>
                 <a:spcPts val="0"/>
@@ -21723,14 +20646,14 @@
             </a:pPr>
             <a:r>
               <a:rPr lang="en-US" sz="2700" dirty="0"/>
-              <a:t>ASR / NLP</a:t>
+              <a:t>Speech Recognition and Natural Language Processing</a:t>
             </a:r>
             <a:endParaRPr sz="2700" dirty="0"/>
           </a:p>
           <a:p>
             <a:pPr marL="457200" lvl="0" indent="-336550" algn="l" rtl="0">
               <a:lnSpc>
-                <a:spcPct val="70000"/>
+                <a:spcPct val="150000"/>
               </a:lnSpc>
               <a:spcBef>
                 <a:spcPts val="0"/>
@@ -21743,7 +20666,7 @@
             </a:pPr>
             <a:r>
               <a:rPr lang="en-US" sz="2700" dirty="0"/>
-              <a:t>AI in RL</a:t>
+              <a:t>Examples of Deep Learning in Real Life</a:t>
             </a:r>
             <a:endParaRPr sz="2700" dirty="0"/>
           </a:p>

</xml_diff>